<commit_message>
Update dependencies and fix minor issues
</commit_message>
<xml_diff>
--- a/doc/eBPF技术实践.pptx
+++ b/doc/eBPF技术实践.pptx
@@ -2,7 +2,7 @@
 <file path=ppt/presentation.xml><?xml version="1.0" encoding="utf-8"?>
 <p:presentation xmlns:a="http://schemas.openxmlformats.org/drawingml/2006/main" xmlns:r="http://schemas.openxmlformats.org/officeDocument/2006/relationships" xmlns:p="http://schemas.openxmlformats.org/presentationml/2006/main" saveSubsetFonts="1">
   <p:sldMasterIdLst>
-    <p:sldMasterId id="2147483648" r:id="rId1"/>
+    <p:sldMasterId id="2147483672" r:id="rId1"/>
   </p:sldMasterIdLst>
   <p:sldIdLst>
     <p:sldId id="256" r:id="rId2"/>
@@ -12,9 +12,9 @@
   <p:notesSz cx="6858000" cy="9144000"/>
   <p:defaultTextStyle>
     <a:defPPr>
-      <a:defRPr lang="zh-CN"/>
+      <a:defRPr lang="en-US"/>
     </a:defPPr>
-    <a:lvl1pPr marL="0" algn="l" defTabSz="914400" rtl="0" eaLnBrk="1" latinLnBrk="0" hangingPunct="1">
+    <a:lvl1pPr marL="0" algn="l" defTabSz="457200" rtl="0" eaLnBrk="1" latinLnBrk="0" hangingPunct="1">
       <a:defRPr sz="1800" kern="1200">
         <a:solidFill>
           <a:schemeClr val="tx1"/>
@@ -24,7 +24,7 @@
         <a:cs typeface="+mn-cs"/>
       </a:defRPr>
     </a:lvl1pPr>
-    <a:lvl2pPr marL="457200" algn="l" defTabSz="914400" rtl="0" eaLnBrk="1" latinLnBrk="0" hangingPunct="1">
+    <a:lvl2pPr marL="457200" algn="l" defTabSz="457200" rtl="0" eaLnBrk="1" latinLnBrk="0" hangingPunct="1">
       <a:defRPr sz="1800" kern="1200">
         <a:solidFill>
           <a:schemeClr val="tx1"/>
@@ -34,7 +34,7 @@
         <a:cs typeface="+mn-cs"/>
       </a:defRPr>
     </a:lvl2pPr>
-    <a:lvl3pPr marL="914400" algn="l" defTabSz="914400" rtl="0" eaLnBrk="1" latinLnBrk="0" hangingPunct="1">
+    <a:lvl3pPr marL="914400" algn="l" defTabSz="457200" rtl="0" eaLnBrk="1" latinLnBrk="0" hangingPunct="1">
       <a:defRPr sz="1800" kern="1200">
         <a:solidFill>
           <a:schemeClr val="tx1"/>
@@ -44,7 +44,7 @@
         <a:cs typeface="+mn-cs"/>
       </a:defRPr>
     </a:lvl3pPr>
-    <a:lvl4pPr marL="1371600" algn="l" defTabSz="914400" rtl="0" eaLnBrk="1" latinLnBrk="0" hangingPunct="1">
+    <a:lvl4pPr marL="1371600" algn="l" defTabSz="457200" rtl="0" eaLnBrk="1" latinLnBrk="0" hangingPunct="1">
       <a:defRPr sz="1800" kern="1200">
         <a:solidFill>
           <a:schemeClr val="tx1"/>
@@ -54,7 +54,7 @@
         <a:cs typeface="+mn-cs"/>
       </a:defRPr>
     </a:lvl4pPr>
-    <a:lvl5pPr marL="1828800" algn="l" defTabSz="914400" rtl="0" eaLnBrk="1" latinLnBrk="0" hangingPunct="1">
+    <a:lvl5pPr marL="1828800" algn="l" defTabSz="457200" rtl="0" eaLnBrk="1" latinLnBrk="0" hangingPunct="1">
       <a:defRPr sz="1800" kern="1200">
         <a:solidFill>
           <a:schemeClr val="tx1"/>
@@ -64,7 +64,7 @@
         <a:cs typeface="+mn-cs"/>
       </a:defRPr>
     </a:lvl5pPr>
-    <a:lvl6pPr marL="2286000" algn="l" defTabSz="914400" rtl="0" eaLnBrk="1" latinLnBrk="0" hangingPunct="1">
+    <a:lvl6pPr marL="2286000" algn="l" defTabSz="457200" rtl="0" eaLnBrk="1" latinLnBrk="0" hangingPunct="1">
       <a:defRPr sz="1800" kern="1200">
         <a:solidFill>
           <a:schemeClr val="tx1"/>
@@ -74,7 +74,7 @@
         <a:cs typeface="+mn-cs"/>
       </a:defRPr>
     </a:lvl6pPr>
-    <a:lvl7pPr marL="2743200" algn="l" defTabSz="914400" rtl="0" eaLnBrk="1" latinLnBrk="0" hangingPunct="1">
+    <a:lvl7pPr marL="2743200" algn="l" defTabSz="457200" rtl="0" eaLnBrk="1" latinLnBrk="0" hangingPunct="1">
       <a:defRPr sz="1800" kern="1200">
         <a:solidFill>
           <a:schemeClr val="tx1"/>
@@ -84,7 +84,7 @@
         <a:cs typeface="+mn-cs"/>
       </a:defRPr>
     </a:lvl7pPr>
-    <a:lvl8pPr marL="3200400" algn="l" defTabSz="914400" rtl="0" eaLnBrk="1" latinLnBrk="0" hangingPunct="1">
+    <a:lvl8pPr marL="3200400" algn="l" defTabSz="457200" rtl="0" eaLnBrk="1" latinLnBrk="0" hangingPunct="1">
       <a:defRPr sz="1800" kern="1200">
         <a:solidFill>
           <a:schemeClr val="tx1"/>
@@ -94,7 +94,7 @@
         <a:cs typeface="+mn-cs"/>
       </a:defRPr>
     </a:lvl8pPr>
-    <a:lvl9pPr marL="3657600" algn="l" defTabSz="914400" rtl="0" eaLnBrk="1" latinLnBrk="0" hangingPunct="1">
+    <a:lvl9pPr marL="3657600" algn="l" defTabSz="457200" rtl="0" eaLnBrk="1" latinLnBrk="0" hangingPunct="1">
       <a:defRPr sz="1800" kern="1200">
         <a:solidFill>
           <a:schemeClr val="tx1"/>
@@ -143,13 +143,7 @@
       </p:grpSpPr>
       <p:sp>
         <p:nvSpPr>
-          <p:cNvPr id="2" name="标题 1">
-            <a:extLst>
-              <a:ext uri="{FF2B5EF4-FFF2-40B4-BE49-F238E27FC236}">
-                <a16:creationId xmlns:a16="http://schemas.microsoft.com/office/drawing/2014/main" id="{9101BEDA-7F5B-6B62-8E4F-A7CE21FB9F61}"/>
-              </a:ext>
-            </a:extLst>
-          </p:cNvPr>
+          <p:cNvPr id="2" name="Title 1"/>
           <p:cNvSpPr>
             <a:spLocks noGrp="1"/>
           </p:cNvSpPr>
@@ -175,18 +169,13 @@
               <a:rPr lang="zh-CN" altLang="en-US"/>
               <a:t>单击此处编辑母版标题样式</a:t>
             </a:r>
-          </a:p>
-        </p:txBody>
-      </p:sp>
-      <p:sp>
-        <p:nvSpPr>
-          <p:cNvPr id="3" name="副标题 2">
-            <a:extLst>
-              <a:ext uri="{FF2B5EF4-FFF2-40B4-BE49-F238E27FC236}">
-                <a16:creationId xmlns:a16="http://schemas.microsoft.com/office/drawing/2014/main" id="{5966CA73-90EC-E261-8E0A-469DDBB38E4A}"/>
-              </a:ext>
-            </a:extLst>
-          </p:cNvPr>
+            <a:endParaRPr lang="en-US" dirty="0"/>
+          </a:p>
+        </p:txBody>
+      </p:sp>
+      <p:sp>
+        <p:nvSpPr>
+          <p:cNvPr id="3" name="Subtitle 2"/>
           <p:cNvSpPr>
             <a:spLocks noGrp="1"/>
           </p:cNvSpPr>
@@ -245,18 +234,13 @@
               <a:rPr lang="zh-CN" altLang="en-US"/>
               <a:t>单击此处编辑母版副标题样式</a:t>
             </a:r>
-          </a:p>
-        </p:txBody>
-      </p:sp>
-      <p:sp>
-        <p:nvSpPr>
-          <p:cNvPr id="4" name="日期占位符 3">
-            <a:extLst>
-              <a:ext uri="{FF2B5EF4-FFF2-40B4-BE49-F238E27FC236}">
-                <a16:creationId xmlns:a16="http://schemas.microsoft.com/office/drawing/2014/main" id="{5D00C4F7-8C7E-B576-2E51-7D06491E606C}"/>
-              </a:ext>
-            </a:extLst>
-          </p:cNvPr>
+            <a:endParaRPr lang="en-US" dirty="0"/>
+          </a:p>
+        </p:txBody>
+      </p:sp>
+      <p:sp>
+        <p:nvSpPr>
+          <p:cNvPr id="4" name="Date Placeholder 3"/>
           <p:cNvSpPr>
             <a:spLocks noGrp="1"/>
           </p:cNvSpPr>
@@ -279,13 +263,7 @@
       </p:sp>
       <p:sp>
         <p:nvSpPr>
-          <p:cNvPr id="5" name="页脚占位符 4">
-            <a:extLst>
-              <a:ext uri="{FF2B5EF4-FFF2-40B4-BE49-F238E27FC236}">
-                <a16:creationId xmlns:a16="http://schemas.microsoft.com/office/drawing/2014/main" id="{02B8E1DC-0DE0-E882-CFC2-9772329DC8C5}"/>
-              </a:ext>
-            </a:extLst>
-          </p:cNvPr>
+          <p:cNvPr id="5" name="Footer Placeholder 4"/>
           <p:cNvSpPr>
             <a:spLocks noGrp="1"/>
           </p:cNvSpPr>
@@ -304,13 +282,7 @@
       </p:sp>
       <p:sp>
         <p:nvSpPr>
-          <p:cNvPr id="6" name="灯片编号占位符 5">
-            <a:extLst>
-              <a:ext uri="{FF2B5EF4-FFF2-40B4-BE49-F238E27FC236}">
-                <a16:creationId xmlns:a16="http://schemas.microsoft.com/office/drawing/2014/main" id="{181BD417-467C-084D-15C9-B6FAF6A98295}"/>
-              </a:ext>
-            </a:extLst>
-          </p:cNvPr>
+          <p:cNvPr id="6" name="Slide Number Placeholder 5"/>
           <p:cNvSpPr>
             <a:spLocks noGrp="1"/>
           </p:cNvSpPr>
@@ -334,7 +306,7 @@
     </p:spTree>
     <p:extLst>
       <p:ext uri="{BB962C8B-B14F-4D97-AF65-F5344CB8AC3E}">
-        <p14:creationId xmlns:p14="http://schemas.microsoft.com/office/powerpoint/2010/main" val="3910215963"/>
+        <p14:creationId xmlns:p14="http://schemas.microsoft.com/office/powerpoint/2010/main" val="986886544"/>
       </p:ext>
     </p:extLst>
   </p:cSld>
@@ -363,13 +335,7 @@
       </p:grpSpPr>
       <p:sp>
         <p:nvSpPr>
-          <p:cNvPr id="2" name="标题 1">
-            <a:extLst>
-              <a:ext uri="{FF2B5EF4-FFF2-40B4-BE49-F238E27FC236}">
-                <a16:creationId xmlns:a16="http://schemas.microsoft.com/office/drawing/2014/main" id="{23B0DEFC-C948-2E40-EADA-159AF04CE099}"/>
-              </a:ext>
-            </a:extLst>
-          </p:cNvPr>
+          <p:cNvPr id="2" name="Title 1"/>
           <p:cNvSpPr>
             <a:spLocks noGrp="1"/>
           </p:cNvSpPr>
@@ -386,18 +352,13 @@
               <a:rPr lang="zh-CN" altLang="en-US"/>
               <a:t>单击此处编辑母版标题样式</a:t>
             </a:r>
-          </a:p>
-        </p:txBody>
-      </p:sp>
-      <p:sp>
-        <p:nvSpPr>
-          <p:cNvPr id="3" name="竖排文字占位符 2">
-            <a:extLst>
-              <a:ext uri="{FF2B5EF4-FFF2-40B4-BE49-F238E27FC236}">
-                <a16:creationId xmlns:a16="http://schemas.microsoft.com/office/drawing/2014/main" id="{BAD5D9EB-8755-3C3B-619D-AC829FA1D386}"/>
-              </a:ext>
-            </a:extLst>
-          </p:cNvPr>
+            <a:endParaRPr lang="en-US" dirty="0"/>
+          </a:p>
+        </p:txBody>
+      </p:sp>
+      <p:sp>
+        <p:nvSpPr>
+          <p:cNvPr id="3" name="Vertical Text Placeholder 2"/>
           <p:cNvSpPr>
             <a:spLocks noGrp="1"/>
           </p:cNvSpPr>
@@ -443,18 +404,13 @@
               <a:rPr lang="zh-CN" altLang="en-US"/>
               <a:t>五级</a:t>
             </a:r>
-          </a:p>
-        </p:txBody>
-      </p:sp>
-      <p:sp>
-        <p:nvSpPr>
-          <p:cNvPr id="4" name="日期占位符 3">
-            <a:extLst>
-              <a:ext uri="{FF2B5EF4-FFF2-40B4-BE49-F238E27FC236}">
-                <a16:creationId xmlns:a16="http://schemas.microsoft.com/office/drawing/2014/main" id="{5FA4302E-8FD0-45A6-6112-F9F1CFC75724}"/>
-              </a:ext>
-            </a:extLst>
-          </p:cNvPr>
+            <a:endParaRPr lang="en-US" dirty="0"/>
+          </a:p>
+        </p:txBody>
+      </p:sp>
+      <p:sp>
+        <p:nvSpPr>
+          <p:cNvPr id="4" name="Date Placeholder 3"/>
           <p:cNvSpPr>
             <a:spLocks noGrp="1"/>
           </p:cNvSpPr>
@@ -477,13 +433,7 @@
       </p:sp>
       <p:sp>
         <p:nvSpPr>
-          <p:cNvPr id="5" name="页脚占位符 4">
-            <a:extLst>
-              <a:ext uri="{FF2B5EF4-FFF2-40B4-BE49-F238E27FC236}">
-                <a16:creationId xmlns:a16="http://schemas.microsoft.com/office/drawing/2014/main" id="{B758B403-6CA9-F931-164B-B64435D970C2}"/>
-              </a:ext>
-            </a:extLst>
-          </p:cNvPr>
+          <p:cNvPr id="5" name="Footer Placeholder 4"/>
           <p:cNvSpPr>
             <a:spLocks noGrp="1"/>
           </p:cNvSpPr>
@@ -502,13 +452,7 @@
       </p:sp>
       <p:sp>
         <p:nvSpPr>
-          <p:cNvPr id="6" name="灯片编号占位符 5">
-            <a:extLst>
-              <a:ext uri="{FF2B5EF4-FFF2-40B4-BE49-F238E27FC236}">
-                <a16:creationId xmlns:a16="http://schemas.microsoft.com/office/drawing/2014/main" id="{028F95ED-DF4A-33EF-1964-B869574A1B19}"/>
-              </a:ext>
-            </a:extLst>
-          </p:cNvPr>
+          <p:cNvPr id="6" name="Slide Number Placeholder 5"/>
           <p:cNvSpPr>
             <a:spLocks noGrp="1"/>
           </p:cNvSpPr>
@@ -532,7 +476,7 @@
     </p:spTree>
     <p:extLst>
       <p:ext uri="{BB962C8B-B14F-4D97-AF65-F5344CB8AC3E}">
-        <p14:creationId xmlns:p14="http://schemas.microsoft.com/office/powerpoint/2010/main" val="1519102081"/>
+        <p14:creationId xmlns:p14="http://schemas.microsoft.com/office/powerpoint/2010/main" val="501730150"/>
       </p:ext>
     </p:extLst>
   </p:cSld>
@@ -561,13 +505,7 @@
       </p:grpSpPr>
       <p:sp>
         <p:nvSpPr>
-          <p:cNvPr id="2" name="竖排标题 1">
-            <a:extLst>
-              <a:ext uri="{FF2B5EF4-FFF2-40B4-BE49-F238E27FC236}">
-                <a16:creationId xmlns:a16="http://schemas.microsoft.com/office/drawing/2014/main" id="{22CB2FF1-B6D6-0918-4A8C-DF192C22EA34}"/>
-              </a:ext>
-            </a:extLst>
-          </p:cNvPr>
+          <p:cNvPr id="2" name="Vertical Title 1"/>
           <p:cNvSpPr>
             <a:spLocks noGrp="1"/>
           </p:cNvSpPr>
@@ -589,18 +527,13 @@
               <a:rPr lang="zh-CN" altLang="en-US"/>
               <a:t>单击此处编辑母版标题样式</a:t>
             </a:r>
-          </a:p>
-        </p:txBody>
-      </p:sp>
-      <p:sp>
-        <p:nvSpPr>
-          <p:cNvPr id="3" name="竖排文字占位符 2">
-            <a:extLst>
-              <a:ext uri="{FF2B5EF4-FFF2-40B4-BE49-F238E27FC236}">
-                <a16:creationId xmlns:a16="http://schemas.microsoft.com/office/drawing/2014/main" id="{2976054F-FBAB-778F-F697-1F58538B4206}"/>
-              </a:ext>
-            </a:extLst>
-          </p:cNvPr>
+            <a:endParaRPr lang="en-US" dirty="0"/>
+          </a:p>
+        </p:txBody>
+      </p:sp>
+      <p:sp>
+        <p:nvSpPr>
+          <p:cNvPr id="3" name="Vertical Text Placeholder 2"/>
           <p:cNvSpPr>
             <a:spLocks noGrp="1"/>
           </p:cNvSpPr>
@@ -651,18 +584,13 @@
               <a:rPr lang="zh-CN" altLang="en-US"/>
               <a:t>五级</a:t>
             </a:r>
-          </a:p>
-        </p:txBody>
-      </p:sp>
-      <p:sp>
-        <p:nvSpPr>
-          <p:cNvPr id="4" name="日期占位符 3">
-            <a:extLst>
-              <a:ext uri="{FF2B5EF4-FFF2-40B4-BE49-F238E27FC236}">
-                <a16:creationId xmlns:a16="http://schemas.microsoft.com/office/drawing/2014/main" id="{9AD77357-68A4-1D1A-0BA7-40BF75413E82}"/>
-              </a:ext>
-            </a:extLst>
-          </p:cNvPr>
+            <a:endParaRPr lang="en-US" dirty="0"/>
+          </a:p>
+        </p:txBody>
+      </p:sp>
+      <p:sp>
+        <p:nvSpPr>
+          <p:cNvPr id="4" name="Date Placeholder 3"/>
           <p:cNvSpPr>
             <a:spLocks noGrp="1"/>
           </p:cNvSpPr>
@@ -685,13 +613,7 @@
       </p:sp>
       <p:sp>
         <p:nvSpPr>
-          <p:cNvPr id="5" name="页脚占位符 4">
-            <a:extLst>
-              <a:ext uri="{FF2B5EF4-FFF2-40B4-BE49-F238E27FC236}">
-                <a16:creationId xmlns:a16="http://schemas.microsoft.com/office/drawing/2014/main" id="{0E1C9646-5151-D307-BA69-F8649EA3BECC}"/>
-              </a:ext>
-            </a:extLst>
-          </p:cNvPr>
+          <p:cNvPr id="5" name="Footer Placeholder 4"/>
           <p:cNvSpPr>
             <a:spLocks noGrp="1"/>
           </p:cNvSpPr>
@@ -710,13 +632,7 @@
       </p:sp>
       <p:sp>
         <p:nvSpPr>
-          <p:cNvPr id="6" name="灯片编号占位符 5">
-            <a:extLst>
-              <a:ext uri="{FF2B5EF4-FFF2-40B4-BE49-F238E27FC236}">
-                <a16:creationId xmlns:a16="http://schemas.microsoft.com/office/drawing/2014/main" id="{B6FF5084-1E3C-CA12-CF40-B1EE5733AB6D}"/>
-              </a:ext>
-            </a:extLst>
-          </p:cNvPr>
+          <p:cNvPr id="6" name="Slide Number Placeholder 5"/>
           <p:cNvSpPr>
             <a:spLocks noGrp="1"/>
           </p:cNvSpPr>
@@ -740,7 +656,7 @@
     </p:spTree>
     <p:extLst>
       <p:ext uri="{BB962C8B-B14F-4D97-AF65-F5344CB8AC3E}">
-        <p14:creationId xmlns:p14="http://schemas.microsoft.com/office/powerpoint/2010/main" val="3416423595"/>
+        <p14:creationId xmlns:p14="http://schemas.microsoft.com/office/powerpoint/2010/main" val="2596754360"/>
       </p:ext>
     </p:extLst>
   </p:cSld>
@@ -769,13 +685,7 @@
       </p:grpSpPr>
       <p:sp>
         <p:nvSpPr>
-          <p:cNvPr id="2" name="标题 1">
-            <a:extLst>
-              <a:ext uri="{FF2B5EF4-FFF2-40B4-BE49-F238E27FC236}">
-                <a16:creationId xmlns:a16="http://schemas.microsoft.com/office/drawing/2014/main" id="{0596D10E-A270-6882-9ED3-A2D8A9FF0BE1}"/>
-              </a:ext>
-            </a:extLst>
-          </p:cNvPr>
+          <p:cNvPr id="2" name="Title 1"/>
           <p:cNvSpPr>
             <a:spLocks noGrp="1"/>
           </p:cNvSpPr>
@@ -792,18 +702,13 @@
               <a:rPr lang="zh-CN" altLang="en-US"/>
               <a:t>单击此处编辑母版标题样式</a:t>
             </a:r>
-          </a:p>
-        </p:txBody>
-      </p:sp>
-      <p:sp>
-        <p:nvSpPr>
-          <p:cNvPr id="3" name="内容占位符 2">
-            <a:extLst>
-              <a:ext uri="{FF2B5EF4-FFF2-40B4-BE49-F238E27FC236}">
-                <a16:creationId xmlns:a16="http://schemas.microsoft.com/office/drawing/2014/main" id="{AD70DE7A-8AA7-FF45-D80F-D30034ED4679}"/>
-              </a:ext>
-            </a:extLst>
-          </p:cNvPr>
+            <a:endParaRPr lang="en-US" dirty="0"/>
+          </a:p>
+        </p:txBody>
+      </p:sp>
+      <p:sp>
+        <p:nvSpPr>
+          <p:cNvPr id="3" name="Content Placeholder 2"/>
           <p:cNvSpPr>
             <a:spLocks noGrp="1"/>
           </p:cNvSpPr>
@@ -849,18 +754,13 @@
               <a:rPr lang="zh-CN" altLang="en-US"/>
               <a:t>五级</a:t>
             </a:r>
-          </a:p>
-        </p:txBody>
-      </p:sp>
-      <p:sp>
-        <p:nvSpPr>
-          <p:cNvPr id="4" name="日期占位符 3">
-            <a:extLst>
-              <a:ext uri="{FF2B5EF4-FFF2-40B4-BE49-F238E27FC236}">
-                <a16:creationId xmlns:a16="http://schemas.microsoft.com/office/drawing/2014/main" id="{B3F746F2-EDDE-F6D6-86FD-169C196714BA}"/>
-              </a:ext>
-            </a:extLst>
-          </p:cNvPr>
+            <a:endParaRPr lang="en-US" dirty="0"/>
+          </a:p>
+        </p:txBody>
+      </p:sp>
+      <p:sp>
+        <p:nvSpPr>
+          <p:cNvPr id="4" name="Date Placeholder 3"/>
           <p:cNvSpPr>
             <a:spLocks noGrp="1"/>
           </p:cNvSpPr>
@@ -883,13 +783,7 @@
       </p:sp>
       <p:sp>
         <p:nvSpPr>
-          <p:cNvPr id="5" name="页脚占位符 4">
-            <a:extLst>
-              <a:ext uri="{FF2B5EF4-FFF2-40B4-BE49-F238E27FC236}">
-                <a16:creationId xmlns:a16="http://schemas.microsoft.com/office/drawing/2014/main" id="{C9F0C7D7-F46D-2355-AA74-27D5A2B92E9A}"/>
-              </a:ext>
-            </a:extLst>
-          </p:cNvPr>
+          <p:cNvPr id="5" name="Footer Placeholder 4"/>
           <p:cNvSpPr>
             <a:spLocks noGrp="1"/>
           </p:cNvSpPr>
@@ -908,13 +802,7 @@
       </p:sp>
       <p:sp>
         <p:nvSpPr>
-          <p:cNvPr id="6" name="灯片编号占位符 5">
-            <a:extLst>
-              <a:ext uri="{FF2B5EF4-FFF2-40B4-BE49-F238E27FC236}">
-                <a16:creationId xmlns:a16="http://schemas.microsoft.com/office/drawing/2014/main" id="{917826B0-A445-6127-C12A-65DD50815737}"/>
-              </a:ext>
-            </a:extLst>
-          </p:cNvPr>
+          <p:cNvPr id="6" name="Slide Number Placeholder 5"/>
           <p:cNvSpPr>
             <a:spLocks noGrp="1"/>
           </p:cNvSpPr>
@@ -938,7 +826,7 @@
     </p:spTree>
     <p:extLst>
       <p:ext uri="{BB962C8B-B14F-4D97-AF65-F5344CB8AC3E}">
-        <p14:creationId xmlns:p14="http://schemas.microsoft.com/office/powerpoint/2010/main" val="848553945"/>
+        <p14:creationId xmlns:p14="http://schemas.microsoft.com/office/powerpoint/2010/main" val="4104810479"/>
       </p:ext>
     </p:extLst>
   </p:cSld>
@@ -967,13 +855,7 @@
       </p:grpSpPr>
       <p:sp>
         <p:nvSpPr>
-          <p:cNvPr id="2" name="标题 1">
-            <a:extLst>
-              <a:ext uri="{FF2B5EF4-FFF2-40B4-BE49-F238E27FC236}">
-                <a16:creationId xmlns:a16="http://schemas.microsoft.com/office/drawing/2014/main" id="{4D119F8D-6131-516E-4E57-696B6E3C0493}"/>
-              </a:ext>
-            </a:extLst>
-          </p:cNvPr>
+          <p:cNvPr id="2" name="Title 1"/>
           <p:cNvSpPr>
             <a:spLocks noGrp="1"/>
           </p:cNvSpPr>
@@ -999,18 +881,13 @@
               <a:rPr lang="zh-CN" altLang="en-US"/>
               <a:t>单击此处编辑母版标题样式</a:t>
             </a:r>
-          </a:p>
-        </p:txBody>
-      </p:sp>
-      <p:sp>
-        <p:nvSpPr>
-          <p:cNvPr id="3" name="文本占位符 2">
-            <a:extLst>
-              <a:ext uri="{FF2B5EF4-FFF2-40B4-BE49-F238E27FC236}">
-                <a16:creationId xmlns:a16="http://schemas.microsoft.com/office/drawing/2014/main" id="{063211D2-4C69-2D07-413C-FF4400508BB9}"/>
-              </a:ext>
-            </a:extLst>
-          </p:cNvPr>
+            <a:endParaRPr lang="en-US" dirty="0"/>
+          </a:p>
+        </p:txBody>
+      </p:sp>
+      <p:sp>
+        <p:nvSpPr>
+          <p:cNvPr id="3" name="Text Placeholder 2"/>
           <p:cNvSpPr>
             <a:spLocks noGrp="1"/>
           </p:cNvSpPr>
@@ -1129,13 +1006,7 @@
       </p:sp>
       <p:sp>
         <p:nvSpPr>
-          <p:cNvPr id="4" name="日期占位符 3">
-            <a:extLst>
-              <a:ext uri="{FF2B5EF4-FFF2-40B4-BE49-F238E27FC236}">
-                <a16:creationId xmlns:a16="http://schemas.microsoft.com/office/drawing/2014/main" id="{881851EA-4BC7-2777-625E-F23B46A18852}"/>
-              </a:ext>
-            </a:extLst>
-          </p:cNvPr>
+          <p:cNvPr id="4" name="Date Placeholder 3"/>
           <p:cNvSpPr>
             <a:spLocks noGrp="1"/>
           </p:cNvSpPr>
@@ -1158,13 +1029,7 @@
       </p:sp>
       <p:sp>
         <p:nvSpPr>
-          <p:cNvPr id="5" name="页脚占位符 4">
-            <a:extLst>
-              <a:ext uri="{FF2B5EF4-FFF2-40B4-BE49-F238E27FC236}">
-                <a16:creationId xmlns:a16="http://schemas.microsoft.com/office/drawing/2014/main" id="{E491203F-7978-C03C-9363-6F7BEF87BE60}"/>
-              </a:ext>
-            </a:extLst>
-          </p:cNvPr>
+          <p:cNvPr id="5" name="Footer Placeholder 4"/>
           <p:cNvSpPr>
             <a:spLocks noGrp="1"/>
           </p:cNvSpPr>
@@ -1183,13 +1048,7 @@
       </p:sp>
       <p:sp>
         <p:nvSpPr>
-          <p:cNvPr id="6" name="灯片编号占位符 5">
-            <a:extLst>
-              <a:ext uri="{FF2B5EF4-FFF2-40B4-BE49-F238E27FC236}">
-                <a16:creationId xmlns:a16="http://schemas.microsoft.com/office/drawing/2014/main" id="{86F5BE27-5381-1F5E-1325-3EF044C5BA23}"/>
-              </a:ext>
-            </a:extLst>
-          </p:cNvPr>
+          <p:cNvPr id="6" name="Slide Number Placeholder 5"/>
           <p:cNvSpPr>
             <a:spLocks noGrp="1"/>
           </p:cNvSpPr>
@@ -1213,7 +1072,7 @@
     </p:spTree>
     <p:extLst>
       <p:ext uri="{BB962C8B-B14F-4D97-AF65-F5344CB8AC3E}">
-        <p14:creationId xmlns:p14="http://schemas.microsoft.com/office/powerpoint/2010/main" val="2441291982"/>
+        <p14:creationId xmlns:p14="http://schemas.microsoft.com/office/powerpoint/2010/main" val="894769044"/>
       </p:ext>
     </p:extLst>
   </p:cSld>
@@ -1242,13 +1101,7 @@
       </p:grpSpPr>
       <p:sp>
         <p:nvSpPr>
-          <p:cNvPr id="2" name="标题 1">
-            <a:extLst>
-              <a:ext uri="{FF2B5EF4-FFF2-40B4-BE49-F238E27FC236}">
-                <a16:creationId xmlns:a16="http://schemas.microsoft.com/office/drawing/2014/main" id="{C8AA93BE-91FB-5453-AA8D-4138AC7CA0ED}"/>
-              </a:ext>
-            </a:extLst>
-          </p:cNvPr>
+          <p:cNvPr id="2" name="Title 1"/>
           <p:cNvSpPr>
             <a:spLocks noGrp="1"/>
           </p:cNvSpPr>
@@ -1265,18 +1118,13 @@
               <a:rPr lang="zh-CN" altLang="en-US"/>
               <a:t>单击此处编辑母版标题样式</a:t>
             </a:r>
-          </a:p>
-        </p:txBody>
-      </p:sp>
-      <p:sp>
-        <p:nvSpPr>
-          <p:cNvPr id="3" name="内容占位符 2">
-            <a:extLst>
-              <a:ext uri="{FF2B5EF4-FFF2-40B4-BE49-F238E27FC236}">
-                <a16:creationId xmlns:a16="http://schemas.microsoft.com/office/drawing/2014/main" id="{E1FED737-AB20-67A7-9414-E2AECE338B40}"/>
-              </a:ext>
-            </a:extLst>
-          </p:cNvPr>
+            <a:endParaRPr lang="en-US" dirty="0"/>
+          </a:p>
+        </p:txBody>
+      </p:sp>
+      <p:sp>
+        <p:nvSpPr>
+          <p:cNvPr id="3" name="Content Placeholder 2"/>
           <p:cNvSpPr>
             <a:spLocks noGrp="1"/>
           </p:cNvSpPr>
@@ -1327,18 +1175,13 @@
               <a:rPr lang="zh-CN" altLang="en-US"/>
               <a:t>五级</a:t>
             </a:r>
-          </a:p>
-        </p:txBody>
-      </p:sp>
-      <p:sp>
-        <p:nvSpPr>
-          <p:cNvPr id="4" name="内容占位符 3">
-            <a:extLst>
-              <a:ext uri="{FF2B5EF4-FFF2-40B4-BE49-F238E27FC236}">
-                <a16:creationId xmlns:a16="http://schemas.microsoft.com/office/drawing/2014/main" id="{16BACF93-FDE6-5801-19D4-4AD12D9DD03B}"/>
-              </a:ext>
-            </a:extLst>
-          </p:cNvPr>
+            <a:endParaRPr lang="en-US" dirty="0"/>
+          </a:p>
+        </p:txBody>
+      </p:sp>
+      <p:sp>
+        <p:nvSpPr>
+          <p:cNvPr id="4" name="Content Placeholder 3"/>
           <p:cNvSpPr>
             <a:spLocks noGrp="1"/>
           </p:cNvSpPr>
@@ -1389,18 +1232,13 @@
               <a:rPr lang="zh-CN" altLang="en-US"/>
               <a:t>五级</a:t>
             </a:r>
-          </a:p>
-        </p:txBody>
-      </p:sp>
-      <p:sp>
-        <p:nvSpPr>
-          <p:cNvPr id="5" name="日期占位符 4">
-            <a:extLst>
-              <a:ext uri="{FF2B5EF4-FFF2-40B4-BE49-F238E27FC236}">
-                <a16:creationId xmlns:a16="http://schemas.microsoft.com/office/drawing/2014/main" id="{F2D22A49-F951-FA5A-9B07-6DD2DB8C6B24}"/>
-              </a:ext>
-            </a:extLst>
-          </p:cNvPr>
+            <a:endParaRPr lang="en-US" dirty="0"/>
+          </a:p>
+        </p:txBody>
+      </p:sp>
+      <p:sp>
+        <p:nvSpPr>
+          <p:cNvPr id="5" name="Date Placeholder 4"/>
           <p:cNvSpPr>
             <a:spLocks noGrp="1"/>
           </p:cNvSpPr>
@@ -1423,13 +1261,7 @@
       </p:sp>
       <p:sp>
         <p:nvSpPr>
-          <p:cNvPr id="6" name="页脚占位符 5">
-            <a:extLst>
-              <a:ext uri="{FF2B5EF4-FFF2-40B4-BE49-F238E27FC236}">
-                <a16:creationId xmlns:a16="http://schemas.microsoft.com/office/drawing/2014/main" id="{6BA5DA73-5453-605C-A069-4615FCF8B017}"/>
-              </a:ext>
-            </a:extLst>
-          </p:cNvPr>
+          <p:cNvPr id="6" name="Footer Placeholder 5"/>
           <p:cNvSpPr>
             <a:spLocks noGrp="1"/>
           </p:cNvSpPr>
@@ -1448,13 +1280,7 @@
       </p:sp>
       <p:sp>
         <p:nvSpPr>
-          <p:cNvPr id="7" name="灯片编号占位符 6">
-            <a:extLst>
-              <a:ext uri="{FF2B5EF4-FFF2-40B4-BE49-F238E27FC236}">
-                <a16:creationId xmlns:a16="http://schemas.microsoft.com/office/drawing/2014/main" id="{E0894878-4C04-3219-0C45-735A0333DA82}"/>
-              </a:ext>
-            </a:extLst>
-          </p:cNvPr>
+          <p:cNvPr id="7" name="Slide Number Placeholder 6"/>
           <p:cNvSpPr>
             <a:spLocks noGrp="1"/>
           </p:cNvSpPr>
@@ -1478,7 +1304,7 @@
     </p:spTree>
     <p:extLst>
       <p:ext uri="{BB962C8B-B14F-4D97-AF65-F5344CB8AC3E}">
-        <p14:creationId xmlns:p14="http://schemas.microsoft.com/office/powerpoint/2010/main" val="3806317510"/>
+        <p14:creationId xmlns:p14="http://schemas.microsoft.com/office/powerpoint/2010/main" val="232205213"/>
       </p:ext>
     </p:extLst>
   </p:cSld>
@@ -1507,13 +1333,7 @@
       </p:grpSpPr>
       <p:sp>
         <p:nvSpPr>
-          <p:cNvPr id="2" name="标题 1">
-            <a:extLst>
-              <a:ext uri="{FF2B5EF4-FFF2-40B4-BE49-F238E27FC236}">
-                <a16:creationId xmlns:a16="http://schemas.microsoft.com/office/drawing/2014/main" id="{D81BD783-4E70-9BF5-368C-B6FBF12C641C}"/>
-              </a:ext>
-            </a:extLst>
-          </p:cNvPr>
+          <p:cNvPr id="2" name="Title 1"/>
           <p:cNvSpPr>
             <a:spLocks noGrp="1"/>
           </p:cNvSpPr>
@@ -1535,18 +1355,13 @@
               <a:rPr lang="zh-CN" altLang="en-US"/>
               <a:t>单击此处编辑母版标题样式</a:t>
             </a:r>
-          </a:p>
-        </p:txBody>
-      </p:sp>
-      <p:sp>
-        <p:nvSpPr>
-          <p:cNvPr id="3" name="文本占位符 2">
-            <a:extLst>
-              <a:ext uri="{FF2B5EF4-FFF2-40B4-BE49-F238E27FC236}">
-                <a16:creationId xmlns:a16="http://schemas.microsoft.com/office/drawing/2014/main" id="{CF2155E7-CD73-E759-C8EA-11ECD9E36D5A}"/>
-              </a:ext>
-            </a:extLst>
-          </p:cNvPr>
+            <a:endParaRPr lang="en-US" dirty="0"/>
+          </a:p>
+        </p:txBody>
+      </p:sp>
+      <p:sp>
+        <p:nvSpPr>
+          <p:cNvPr id="3" name="Text Placeholder 2"/>
           <p:cNvSpPr>
             <a:spLocks noGrp="1"/>
           </p:cNvSpPr>
@@ -1611,13 +1426,7 @@
       </p:sp>
       <p:sp>
         <p:nvSpPr>
-          <p:cNvPr id="4" name="内容占位符 3">
-            <a:extLst>
-              <a:ext uri="{FF2B5EF4-FFF2-40B4-BE49-F238E27FC236}">
-                <a16:creationId xmlns:a16="http://schemas.microsoft.com/office/drawing/2014/main" id="{575F363A-83AA-D87C-BD31-F69C29C1C0B2}"/>
-              </a:ext>
-            </a:extLst>
-          </p:cNvPr>
+          <p:cNvPr id="4" name="Content Placeholder 3"/>
           <p:cNvSpPr>
             <a:spLocks noGrp="1"/>
           </p:cNvSpPr>
@@ -1668,18 +1477,13 @@
               <a:rPr lang="zh-CN" altLang="en-US"/>
               <a:t>五级</a:t>
             </a:r>
-          </a:p>
-        </p:txBody>
-      </p:sp>
-      <p:sp>
-        <p:nvSpPr>
-          <p:cNvPr id="5" name="文本占位符 4">
-            <a:extLst>
-              <a:ext uri="{FF2B5EF4-FFF2-40B4-BE49-F238E27FC236}">
-                <a16:creationId xmlns:a16="http://schemas.microsoft.com/office/drawing/2014/main" id="{AA3E52A8-DF27-1BFE-E47F-7585A5D3636A}"/>
-              </a:ext>
-            </a:extLst>
-          </p:cNvPr>
+            <a:endParaRPr lang="en-US" dirty="0"/>
+          </a:p>
+        </p:txBody>
+      </p:sp>
+      <p:sp>
+        <p:nvSpPr>
+          <p:cNvPr id="5" name="Text Placeholder 4"/>
           <p:cNvSpPr>
             <a:spLocks noGrp="1"/>
           </p:cNvSpPr>
@@ -1744,13 +1548,7 @@
       </p:sp>
       <p:sp>
         <p:nvSpPr>
-          <p:cNvPr id="6" name="内容占位符 5">
-            <a:extLst>
-              <a:ext uri="{FF2B5EF4-FFF2-40B4-BE49-F238E27FC236}">
-                <a16:creationId xmlns:a16="http://schemas.microsoft.com/office/drawing/2014/main" id="{E95A05A3-E614-4CC9-9FA7-3A2EFFD8A6BC}"/>
-              </a:ext>
-            </a:extLst>
-          </p:cNvPr>
+          <p:cNvPr id="6" name="Content Placeholder 5"/>
           <p:cNvSpPr>
             <a:spLocks noGrp="1"/>
           </p:cNvSpPr>
@@ -1801,18 +1599,13 @@
               <a:rPr lang="zh-CN" altLang="en-US"/>
               <a:t>五级</a:t>
             </a:r>
-          </a:p>
-        </p:txBody>
-      </p:sp>
-      <p:sp>
-        <p:nvSpPr>
-          <p:cNvPr id="7" name="日期占位符 6">
-            <a:extLst>
-              <a:ext uri="{FF2B5EF4-FFF2-40B4-BE49-F238E27FC236}">
-                <a16:creationId xmlns:a16="http://schemas.microsoft.com/office/drawing/2014/main" id="{080D1242-E9BB-76BB-BF04-0A15ADF48707}"/>
-              </a:ext>
-            </a:extLst>
-          </p:cNvPr>
+            <a:endParaRPr lang="en-US" dirty="0"/>
+          </a:p>
+        </p:txBody>
+      </p:sp>
+      <p:sp>
+        <p:nvSpPr>
+          <p:cNvPr id="7" name="Date Placeholder 6"/>
           <p:cNvSpPr>
             <a:spLocks noGrp="1"/>
           </p:cNvSpPr>
@@ -1835,13 +1628,7 @@
       </p:sp>
       <p:sp>
         <p:nvSpPr>
-          <p:cNvPr id="8" name="页脚占位符 7">
-            <a:extLst>
-              <a:ext uri="{FF2B5EF4-FFF2-40B4-BE49-F238E27FC236}">
-                <a16:creationId xmlns:a16="http://schemas.microsoft.com/office/drawing/2014/main" id="{D6E4E02F-262E-009B-EAC7-858A4A2C2F1E}"/>
-              </a:ext>
-            </a:extLst>
-          </p:cNvPr>
+          <p:cNvPr id="8" name="Footer Placeholder 7"/>
           <p:cNvSpPr>
             <a:spLocks noGrp="1"/>
           </p:cNvSpPr>
@@ -1860,13 +1647,7 @@
       </p:sp>
       <p:sp>
         <p:nvSpPr>
-          <p:cNvPr id="9" name="灯片编号占位符 8">
-            <a:extLst>
-              <a:ext uri="{FF2B5EF4-FFF2-40B4-BE49-F238E27FC236}">
-                <a16:creationId xmlns:a16="http://schemas.microsoft.com/office/drawing/2014/main" id="{FFC73ADF-0769-F67F-D397-7ED17949C10E}"/>
-              </a:ext>
-            </a:extLst>
-          </p:cNvPr>
+          <p:cNvPr id="9" name="Slide Number Placeholder 8"/>
           <p:cNvSpPr>
             <a:spLocks noGrp="1"/>
           </p:cNvSpPr>
@@ -1890,7 +1671,7 @@
     </p:spTree>
     <p:extLst>
       <p:ext uri="{BB962C8B-B14F-4D97-AF65-F5344CB8AC3E}">
-        <p14:creationId xmlns:p14="http://schemas.microsoft.com/office/powerpoint/2010/main" val="1109514628"/>
+        <p14:creationId xmlns:p14="http://schemas.microsoft.com/office/powerpoint/2010/main" val="1429447228"/>
       </p:ext>
     </p:extLst>
   </p:cSld>
@@ -1919,13 +1700,7 @@
       </p:grpSpPr>
       <p:sp>
         <p:nvSpPr>
-          <p:cNvPr id="2" name="标题 1">
-            <a:extLst>
-              <a:ext uri="{FF2B5EF4-FFF2-40B4-BE49-F238E27FC236}">
-                <a16:creationId xmlns:a16="http://schemas.microsoft.com/office/drawing/2014/main" id="{928A9B20-2C60-97C0-9B46-F2797300A877}"/>
-              </a:ext>
-            </a:extLst>
-          </p:cNvPr>
+          <p:cNvPr id="2" name="Title 1"/>
           <p:cNvSpPr>
             <a:spLocks noGrp="1"/>
           </p:cNvSpPr>
@@ -1942,18 +1717,13 @@
               <a:rPr lang="zh-CN" altLang="en-US"/>
               <a:t>单击此处编辑母版标题样式</a:t>
             </a:r>
-          </a:p>
-        </p:txBody>
-      </p:sp>
-      <p:sp>
-        <p:nvSpPr>
-          <p:cNvPr id="3" name="日期占位符 2">
-            <a:extLst>
-              <a:ext uri="{FF2B5EF4-FFF2-40B4-BE49-F238E27FC236}">
-                <a16:creationId xmlns:a16="http://schemas.microsoft.com/office/drawing/2014/main" id="{2A2EE4E7-406A-8890-371E-DC59B79E4E3D}"/>
-              </a:ext>
-            </a:extLst>
-          </p:cNvPr>
+            <a:endParaRPr lang="en-US" dirty="0"/>
+          </a:p>
+        </p:txBody>
+      </p:sp>
+      <p:sp>
+        <p:nvSpPr>
+          <p:cNvPr id="3" name="Date Placeholder 2"/>
           <p:cNvSpPr>
             <a:spLocks noGrp="1"/>
           </p:cNvSpPr>
@@ -1976,13 +1746,7 @@
       </p:sp>
       <p:sp>
         <p:nvSpPr>
-          <p:cNvPr id="4" name="页脚占位符 3">
-            <a:extLst>
-              <a:ext uri="{FF2B5EF4-FFF2-40B4-BE49-F238E27FC236}">
-                <a16:creationId xmlns:a16="http://schemas.microsoft.com/office/drawing/2014/main" id="{C080DC45-371D-4CAF-4BB7-01126FE7D428}"/>
-              </a:ext>
-            </a:extLst>
-          </p:cNvPr>
+          <p:cNvPr id="4" name="Footer Placeholder 3"/>
           <p:cNvSpPr>
             <a:spLocks noGrp="1"/>
           </p:cNvSpPr>
@@ -2001,13 +1765,7 @@
       </p:sp>
       <p:sp>
         <p:nvSpPr>
-          <p:cNvPr id="5" name="灯片编号占位符 4">
-            <a:extLst>
-              <a:ext uri="{FF2B5EF4-FFF2-40B4-BE49-F238E27FC236}">
-                <a16:creationId xmlns:a16="http://schemas.microsoft.com/office/drawing/2014/main" id="{08677B59-F79E-08B5-6602-EC8312EA9ACD}"/>
-              </a:ext>
-            </a:extLst>
-          </p:cNvPr>
+          <p:cNvPr id="5" name="Slide Number Placeholder 4"/>
           <p:cNvSpPr>
             <a:spLocks noGrp="1"/>
           </p:cNvSpPr>
@@ -2031,7 +1789,7 @@
     </p:spTree>
     <p:extLst>
       <p:ext uri="{BB962C8B-B14F-4D97-AF65-F5344CB8AC3E}">
-        <p14:creationId xmlns:p14="http://schemas.microsoft.com/office/powerpoint/2010/main" val="2267369797"/>
+        <p14:creationId xmlns:p14="http://schemas.microsoft.com/office/powerpoint/2010/main" val="2628158293"/>
       </p:ext>
     </p:extLst>
   </p:cSld>
@@ -2060,13 +1818,7 @@
       </p:grpSpPr>
       <p:sp>
         <p:nvSpPr>
-          <p:cNvPr id="2" name="日期占位符 1">
-            <a:extLst>
-              <a:ext uri="{FF2B5EF4-FFF2-40B4-BE49-F238E27FC236}">
-                <a16:creationId xmlns:a16="http://schemas.microsoft.com/office/drawing/2014/main" id="{E900F340-0755-BF91-41D4-74A2B6EED7CF}"/>
-              </a:ext>
-            </a:extLst>
-          </p:cNvPr>
+          <p:cNvPr id="2" name="Date Placeholder 1"/>
           <p:cNvSpPr>
             <a:spLocks noGrp="1"/>
           </p:cNvSpPr>
@@ -2089,13 +1841,7 @@
       </p:sp>
       <p:sp>
         <p:nvSpPr>
-          <p:cNvPr id="3" name="页脚占位符 2">
-            <a:extLst>
-              <a:ext uri="{FF2B5EF4-FFF2-40B4-BE49-F238E27FC236}">
-                <a16:creationId xmlns:a16="http://schemas.microsoft.com/office/drawing/2014/main" id="{54E4030F-0BE4-2419-3D29-698105179FE3}"/>
-              </a:ext>
-            </a:extLst>
-          </p:cNvPr>
+          <p:cNvPr id="3" name="Footer Placeholder 2"/>
           <p:cNvSpPr>
             <a:spLocks noGrp="1"/>
           </p:cNvSpPr>
@@ -2114,13 +1860,7 @@
       </p:sp>
       <p:sp>
         <p:nvSpPr>
-          <p:cNvPr id="4" name="灯片编号占位符 3">
-            <a:extLst>
-              <a:ext uri="{FF2B5EF4-FFF2-40B4-BE49-F238E27FC236}">
-                <a16:creationId xmlns:a16="http://schemas.microsoft.com/office/drawing/2014/main" id="{D95B4BFB-23EB-D72F-91F2-2930CF7FB70B}"/>
-              </a:ext>
-            </a:extLst>
-          </p:cNvPr>
+          <p:cNvPr id="4" name="Slide Number Placeholder 3"/>
           <p:cNvSpPr>
             <a:spLocks noGrp="1"/>
           </p:cNvSpPr>
@@ -2144,7 +1884,7 @@
     </p:spTree>
     <p:extLst>
       <p:ext uri="{BB962C8B-B14F-4D97-AF65-F5344CB8AC3E}">
-        <p14:creationId xmlns:p14="http://schemas.microsoft.com/office/powerpoint/2010/main" val="2491870579"/>
+        <p14:creationId xmlns:p14="http://schemas.microsoft.com/office/powerpoint/2010/main" val="3893792345"/>
       </p:ext>
     </p:extLst>
   </p:cSld>
@@ -2173,13 +1913,7 @@
       </p:grpSpPr>
       <p:sp>
         <p:nvSpPr>
-          <p:cNvPr id="2" name="标题 1">
-            <a:extLst>
-              <a:ext uri="{FF2B5EF4-FFF2-40B4-BE49-F238E27FC236}">
-                <a16:creationId xmlns:a16="http://schemas.microsoft.com/office/drawing/2014/main" id="{F51FABFC-484F-3559-DE85-F947869D59E4}"/>
-              </a:ext>
-            </a:extLst>
-          </p:cNvPr>
+          <p:cNvPr id="2" name="Title 1"/>
           <p:cNvSpPr>
             <a:spLocks noGrp="1"/>
           </p:cNvSpPr>
@@ -2205,18 +1939,13 @@
               <a:rPr lang="zh-CN" altLang="en-US"/>
               <a:t>单击此处编辑母版标题样式</a:t>
             </a:r>
-          </a:p>
-        </p:txBody>
-      </p:sp>
-      <p:sp>
-        <p:nvSpPr>
-          <p:cNvPr id="3" name="内容占位符 2">
-            <a:extLst>
-              <a:ext uri="{FF2B5EF4-FFF2-40B4-BE49-F238E27FC236}">
-                <a16:creationId xmlns:a16="http://schemas.microsoft.com/office/drawing/2014/main" id="{6E930A18-5274-EFDB-AA36-F99A53903A86}"/>
-              </a:ext>
-            </a:extLst>
-          </p:cNvPr>
+            <a:endParaRPr lang="en-US" dirty="0"/>
+          </a:p>
+        </p:txBody>
+      </p:sp>
+      <p:sp>
+        <p:nvSpPr>
+          <p:cNvPr id="3" name="Content Placeholder 2"/>
           <p:cNvSpPr>
             <a:spLocks noGrp="1"/>
           </p:cNvSpPr>
@@ -2295,18 +2024,13 @@
               <a:rPr lang="zh-CN" altLang="en-US"/>
               <a:t>五级</a:t>
             </a:r>
-          </a:p>
-        </p:txBody>
-      </p:sp>
-      <p:sp>
-        <p:nvSpPr>
-          <p:cNvPr id="4" name="文本占位符 3">
-            <a:extLst>
-              <a:ext uri="{FF2B5EF4-FFF2-40B4-BE49-F238E27FC236}">
-                <a16:creationId xmlns:a16="http://schemas.microsoft.com/office/drawing/2014/main" id="{40DC3A38-D6B6-77F8-D7A0-8E320457202D}"/>
-              </a:ext>
-            </a:extLst>
-          </p:cNvPr>
+            <a:endParaRPr lang="en-US" dirty="0"/>
+          </a:p>
+        </p:txBody>
+      </p:sp>
+      <p:sp>
+        <p:nvSpPr>
+          <p:cNvPr id="4" name="Text Placeholder 3"/>
           <p:cNvSpPr>
             <a:spLocks noGrp="1"/>
           </p:cNvSpPr>
@@ -2371,13 +2095,7 @@
       </p:sp>
       <p:sp>
         <p:nvSpPr>
-          <p:cNvPr id="5" name="日期占位符 4">
-            <a:extLst>
-              <a:ext uri="{FF2B5EF4-FFF2-40B4-BE49-F238E27FC236}">
-                <a16:creationId xmlns:a16="http://schemas.microsoft.com/office/drawing/2014/main" id="{22B7EB2F-A3F2-2656-12BB-039BBA80A376}"/>
-              </a:ext>
-            </a:extLst>
-          </p:cNvPr>
+          <p:cNvPr id="5" name="Date Placeholder 4"/>
           <p:cNvSpPr>
             <a:spLocks noGrp="1"/>
           </p:cNvSpPr>
@@ -2400,13 +2118,7 @@
       </p:sp>
       <p:sp>
         <p:nvSpPr>
-          <p:cNvPr id="6" name="页脚占位符 5">
-            <a:extLst>
-              <a:ext uri="{FF2B5EF4-FFF2-40B4-BE49-F238E27FC236}">
-                <a16:creationId xmlns:a16="http://schemas.microsoft.com/office/drawing/2014/main" id="{5D9829DE-0BEE-A3B0-258E-D7474131B4B0}"/>
-              </a:ext>
-            </a:extLst>
-          </p:cNvPr>
+          <p:cNvPr id="6" name="Footer Placeholder 5"/>
           <p:cNvSpPr>
             <a:spLocks noGrp="1"/>
           </p:cNvSpPr>
@@ -2425,13 +2137,7 @@
       </p:sp>
       <p:sp>
         <p:nvSpPr>
-          <p:cNvPr id="7" name="灯片编号占位符 6">
-            <a:extLst>
-              <a:ext uri="{FF2B5EF4-FFF2-40B4-BE49-F238E27FC236}">
-                <a16:creationId xmlns:a16="http://schemas.microsoft.com/office/drawing/2014/main" id="{EA3BB67D-B484-8B13-A24C-074BA43744FE}"/>
-              </a:ext>
-            </a:extLst>
-          </p:cNvPr>
+          <p:cNvPr id="7" name="Slide Number Placeholder 6"/>
           <p:cNvSpPr>
             <a:spLocks noGrp="1"/>
           </p:cNvSpPr>
@@ -2455,7 +2161,7 @@
     </p:spTree>
     <p:extLst>
       <p:ext uri="{BB962C8B-B14F-4D97-AF65-F5344CB8AC3E}">
-        <p14:creationId xmlns:p14="http://schemas.microsoft.com/office/powerpoint/2010/main" val="1467961274"/>
+        <p14:creationId xmlns:p14="http://schemas.microsoft.com/office/powerpoint/2010/main" val="705471940"/>
       </p:ext>
     </p:extLst>
   </p:cSld>
@@ -2484,13 +2190,7 @@
       </p:grpSpPr>
       <p:sp>
         <p:nvSpPr>
-          <p:cNvPr id="2" name="标题 1">
-            <a:extLst>
-              <a:ext uri="{FF2B5EF4-FFF2-40B4-BE49-F238E27FC236}">
-                <a16:creationId xmlns:a16="http://schemas.microsoft.com/office/drawing/2014/main" id="{503BDB1B-68D7-3A3C-E08A-66746A4B67A3}"/>
-              </a:ext>
-            </a:extLst>
-          </p:cNvPr>
+          <p:cNvPr id="2" name="Title 1"/>
           <p:cNvSpPr>
             <a:spLocks noGrp="1"/>
           </p:cNvSpPr>
@@ -2516,20 +2216,15 @@
               <a:rPr lang="zh-CN" altLang="en-US"/>
               <a:t>单击此处编辑母版标题样式</a:t>
             </a:r>
-          </a:p>
-        </p:txBody>
-      </p:sp>
-      <p:sp>
-        <p:nvSpPr>
-          <p:cNvPr id="3" name="图片占位符 2">
-            <a:extLst>
-              <a:ext uri="{FF2B5EF4-FFF2-40B4-BE49-F238E27FC236}">
-                <a16:creationId xmlns:a16="http://schemas.microsoft.com/office/drawing/2014/main" id="{DCA56DA5-4FAD-B6F1-8ACF-6FD6ECBE1559}"/>
-              </a:ext>
-            </a:extLst>
-          </p:cNvPr>
-          <p:cNvSpPr>
-            <a:spLocks noGrp="1"/>
+            <a:endParaRPr lang="en-US" dirty="0"/>
+          </a:p>
+        </p:txBody>
+      </p:sp>
+      <p:sp>
+        <p:nvSpPr>
+          <p:cNvPr id="3" name="Picture Placeholder 2"/>
+          <p:cNvSpPr>
+            <a:spLocks noGrp="1" noChangeAspect="1"/>
           </p:cNvSpPr>
           <p:nvPr>
             <p:ph type="pic" idx="1"/>
@@ -2542,7 +2237,7 @@
           </a:xfrm>
         </p:spPr>
         <p:txBody>
-          <a:bodyPr/>
+          <a:bodyPr anchor="t"/>
           <a:lstStyle>
             <a:lvl1pPr marL="0" indent="0">
               <a:buNone/>
@@ -2582,19 +2277,17 @@
             </a:lvl9pPr>
           </a:lstStyle>
           <a:p>
-            <a:endParaRPr lang="zh-CN" altLang="en-US"/>
-          </a:p>
-        </p:txBody>
-      </p:sp>
-      <p:sp>
-        <p:nvSpPr>
-          <p:cNvPr id="4" name="文本占位符 3">
-            <a:extLst>
-              <a:ext uri="{FF2B5EF4-FFF2-40B4-BE49-F238E27FC236}">
-                <a16:creationId xmlns:a16="http://schemas.microsoft.com/office/drawing/2014/main" id="{BF8EC9F3-414F-0E86-BAFE-74165BA97C98}"/>
-              </a:ext>
-            </a:extLst>
-          </p:cNvPr>
+            <a:r>
+              <a:rPr lang="zh-CN" altLang="en-US"/>
+              <a:t>单击图标添加图片</a:t>
+            </a:r>
+            <a:endParaRPr lang="en-US" dirty="0"/>
+          </a:p>
+        </p:txBody>
+      </p:sp>
+      <p:sp>
+        <p:nvSpPr>
+          <p:cNvPr id="4" name="Text Placeholder 3"/>
           <p:cNvSpPr>
             <a:spLocks noGrp="1"/>
           </p:cNvSpPr>
@@ -2659,13 +2352,7 @@
       </p:sp>
       <p:sp>
         <p:nvSpPr>
-          <p:cNvPr id="5" name="日期占位符 4">
-            <a:extLst>
-              <a:ext uri="{FF2B5EF4-FFF2-40B4-BE49-F238E27FC236}">
-                <a16:creationId xmlns:a16="http://schemas.microsoft.com/office/drawing/2014/main" id="{4FE0B30F-28A9-4ADD-86F1-4B0785A2E5D8}"/>
-              </a:ext>
-            </a:extLst>
-          </p:cNvPr>
+          <p:cNvPr id="5" name="Date Placeholder 4"/>
           <p:cNvSpPr>
             <a:spLocks noGrp="1"/>
           </p:cNvSpPr>
@@ -2688,13 +2375,7 @@
       </p:sp>
       <p:sp>
         <p:nvSpPr>
-          <p:cNvPr id="6" name="页脚占位符 5">
-            <a:extLst>
-              <a:ext uri="{FF2B5EF4-FFF2-40B4-BE49-F238E27FC236}">
-                <a16:creationId xmlns:a16="http://schemas.microsoft.com/office/drawing/2014/main" id="{4BF06BEC-73FA-CF3C-84B5-2EFA44FEA544}"/>
-              </a:ext>
-            </a:extLst>
-          </p:cNvPr>
+          <p:cNvPr id="6" name="Footer Placeholder 5"/>
           <p:cNvSpPr>
             <a:spLocks noGrp="1"/>
           </p:cNvSpPr>
@@ -2713,13 +2394,7 @@
       </p:sp>
       <p:sp>
         <p:nvSpPr>
-          <p:cNvPr id="7" name="灯片编号占位符 6">
-            <a:extLst>
-              <a:ext uri="{FF2B5EF4-FFF2-40B4-BE49-F238E27FC236}">
-                <a16:creationId xmlns:a16="http://schemas.microsoft.com/office/drawing/2014/main" id="{669C65AD-69E4-94BA-BAEC-2E19C2063E9A}"/>
-              </a:ext>
-            </a:extLst>
-          </p:cNvPr>
+          <p:cNvPr id="7" name="Slide Number Placeholder 6"/>
           <p:cNvSpPr>
             <a:spLocks noGrp="1"/>
           </p:cNvSpPr>
@@ -2743,7 +2418,7 @@
     </p:spTree>
     <p:extLst>
       <p:ext uri="{BB962C8B-B14F-4D97-AF65-F5344CB8AC3E}">
-        <p14:creationId xmlns:p14="http://schemas.microsoft.com/office/powerpoint/2010/main" val="3916078502"/>
+        <p14:creationId xmlns:p14="http://schemas.microsoft.com/office/powerpoint/2010/main" val="13452160"/>
       </p:ext>
     </p:extLst>
   </p:cSld>
@@ -2777,13 +2452,7 @@
       </p:grpSpPr>
       <p:sp>
         <p:nvSpPr>
-          <p:cNvPr id="2" name="标题占位符 1">
-            <a:extLst>
-              <a:ext uri="{FF2B5EF4-FFF2-40B4-BE49-F238E27FC236}">
-                <a16:creationId xmlns:a16="http://schemas.microsoft.com/office/drawing/2014/main" id="{A5EA6774-583B-BC15-A8D7-ADF72381B34A}"/>
-              </a:ext>
-            </a:extLst>
-          </p:cNvPr>
+          <p:cNvPr id="2" name="Title Placeholder 1"/>
           <p:cNvSpPr>
             <a:spLocks noGrp="1"/>
           </p:cNvSpPr>
@@ -2810,18 +2479,13 @@
               <a:rPr lang="zh-CN" altLang="en-US"/>
               <a:t>单击此处编辑母版标题样式</a:t>
             </a:r>
-          </a:p>
-        </p:txBody>
-      </p:sp>
-      <p:sp>
-        <p:nvSpPr>
-          <p:cNvPr id="3" name="文本占位符 2">
-            <a:extLst>
-              <a:ext uri="{FF2B5EF4-FFF2-40B4-BE49-F238E27FC236}">
-                <a16:creationId xmlns:a16="http://schemas.microsoft.com/office/drawing/2014/main" id="{52B70B91-0755-3106-0D66-EE4A20BCFE42}"/>
-              </a:ext>
-            </a:extLst>
-          </p:cNvPr>
+            <a:endParaRPr lang="en-US" dirty="0"/>
+          </a:p>
+        </p:txBody>
+      </p:sp>
+      <p:sp>
+        <p:nvSpPr>
+          <p:cNvPr id="3" name="Text Placeholder 2"/>
           <p:cNvSpPr>
             <a:spLocks noGrp="1"/>
           </p:cNvSpPr>
@@ -2877,18 +2541,13 @@
               <a:rPr lang="zh-CN" altLang="en-US"/>
               <a:t>五级</a:t>
             </a:r>
-          </a:p>
-        </p:txBody>
-      </p:sp>
-      <p:sp>
-        <p:nvSpPr>
-          <p:cNvPr id="4" name="日期占位符 3">
-            <a:extLst>
-              <a:ext uri="{FF2B5EF4-FFF2-40B4-BE49-F238E27FC236}">
-                <a16:creationId xmlns:a16="http://schemas.microsoft.com/office/drawing/2014/main" id="{8FF20A68-65ED-FA2C-FBFD-A8BBDCDD3520}"/>
-              </a:ext>
-            </a:extLst>
-          </p:cNvPr>
+            <a:endParaRPr lang="en-US" dirty="0"/>
+          </a:p>
+        </p:txBody>
+      </p:sp>
+      <p:sp>
+        <p:nvSpPr>
+          <p:cNvPr id="4" name="Date Placeholder 3"/>
           <p:cNvSpPr>
             <a:spLocks noGrp="1"/>
           </p:cNvSpPr>
@@ -2929,13 +2588,7 @@
       </p:sp>
       <p:sp>
         <p:nvSpPr>
-          <p:cNvPr id="5" name="页脚占位符 4">
-            <a:extLst>
-              <a:ext uri="{FF2B5EF4-FFF2-40B4-BE49-F238E27FC236}">
-                <a16:creationId xmlns:a16="http://schemas.microsoft.com/office/drawing/2014/main" id="{679A66FF-86CD-22B2-DDDA-B8C527FA8252}"/>
-              </a:ext>
-            </a:extLst>
-          </p:cNvPr>
+          <p:cNvPr id="5" name="Footer Placeholder 4"/>
           <p:cNvSpPr>
             <a:spLocks noGrp="1"/>
           </p:cNvSpPr>
@@ -2972,13 +2625,7 @@
       </p:sp>
       <p:sp>
         <p:nvSpPr>
-          <p:cNvPr id="6" name="灯片编号占位符 5">
-            <a:extLst>
-              <a:ext uri="{FF2B5EF4-FFF2-40B4-BE49-F238E27FC236}">
-                <a16:creationId xmlns:a16="http://schemas.microsoft.com/office/drawing/2014/main" id="{B2E86362-9078-90E7-C870-D1B0582E7434}"/>
-              </a:ext>
-            </a:extLst>
-          </p:cNvPr>
+          <p:cNvPr id="6" name="Slide Number Placeholder 5"/>
           <p:cNvSpPr>
             <a:spLocks noGrp="1"/>
           </p:cNvSpPr>
@@ -3020,23 +2667,23 @@
     </p:spTree>
     <p:extLst>
       <p:ext uri="{BB962C8B-B14F-4D97-AF65-F5344CB8AC3E}">
-        <p14:creationId xmlns:p14="http://schemas.microsoft.com/office/powerpoint/2010/main" val="1217690132"/>
+        <p14:creationId xmlns:p14="http://schemas.microsoft.com/office/powerpoint/2010/main" val="1524881297"/>
       </p:ext>
     </p:extLst>
   </p:cSld>
   <p:clrMap bg1="lt1" tx1="dk1" bg2="lt2" tx2="dk2" accent1="accent1" accent2="accent2" accent3="accent3" accent4="accent4" accent5="accent5" accent6="accent6" hlink="hlink" folHlink="folHlink"/>
   <p:sldLayoutIdLst>
-    <p:sldLayoutId id="2147483649" r:id="rId1"/>
-    <p:sldLayoutId id="2147483650" r:id="rId2"/>
-    <p:sldLayoutId id="2147483651" r:id="rId3"/>
-    <p:sldLayoutId id="2147483652" r:id="rId4"/>
-    <p:sldLayoutId id="2147483653" r:id="rId5"/>
-    <p:sldLayoutId id="2147483654" r:id="rId6"/>
-    <p:sldLayoutId id="2147483655" r:id="rId7"/>
-    <p:sldLayoutId id="2147483656" r:id="rId8"/>
-    <p:sldLayoutId id="2147483657" r:id="rId9"/>
-    <p:sldLayoutId id="2147483658" r:id="rId10"/>
-    <p:sldLayoutId id="2147483659" r:id="rId11"/>
+    <p:sldLayoutId id="2147483673" r:id="rId1"/>
+    <p:sldLayoutId id="2147483674" r:id="rId2"/>
+    <p:sldLayoutId id="2147483675" r:id="rId3"/>
+    <p:sldLayoutId id="2147483676" r:id="rId4"/>
+    <p:sldLayoutId id="2147483677" r:id="rId5"/>
+    <p:sldLayoutId id="2147483678" r:id="rId6"/>
+    <p:sldLayoutId id="2147483679" r:id="rId7"/>
+    <p:sldLayoutId id="2147483680" r:id="rId8"/>
+    <p:sldLayoutId id="2147483681" r:id="rId9"/>
+    <p:sldLayoutId id="2147483682" r:id="rId10"/>
+    <p:sldLayoutId id="2147483683" r:id="rId11"/>
   </p:sldLayoutIdLst>
   <p:txStyles>
     <p:titleStyle>
@@ -3224,7 +2871,7 @@
     </p:bodyStyle>
     <p:otherStyle>
       <a:defPPr>
-        <a:defRPr lang="zh-CN"/>
+        <a:defRPr lang="en-US"/>
       </a:defPPr>
       <a:lvl1pPr marL="0" algn="l" defTabSz="914400" rtl="0" eaLnBrk="1" latinLnBrk="0" hangingPunct="1">
         <a:defRPr sz="1800" kern="1200">
@@ -3425,13 +3072,13 @@
             </a:pPr>
             <a:r>
               <a:rPr lang="zh-CN" altLang="en-US" sz="2800" dirty="0">
-                <a:latin typeface="微软雅黑" panose="020B0503020204020204" pitchFamily="34" charset="-122"/>
+                <a:latin typeface="Microsoft Tai Le" panose="020B0502040204020203" pitchFamily="34" charset="0"/>
                 <a:ea typeface="微软雅黑" panose="020B0503020204020204" pitchFamily="34" charset="-122"/>
               </a:rPr>
               <a:t>简介</a:t>
             </a:r>
             <a:endParaRPr lang="en-US" altLang="zh-CN" sz="2800" dirty="0">
-              <a:latin typeface="微软雅黑" panose="020B0503020204020204" pitchFamily="34" charset="-122"/>
+              <a:latin typeface="Microsoft Tai Le" panose="020B0502040204020203" pitchFamily="34" charset="0"/>
               <a:ea typeface="微软雅黑" panose="020B0503020204020204" pitchFamily="34" charset="-122"/>
             </a:endParaRPr>
           </a:p>
@@ -3455,8 +3102,9 @@
                   <a:srgbClr val="1C1917"/>
                 </a:solidFill>
                 <a:effectLst/>
-                <a:latin typeface="微软雅黑" panose="020B0503020204020204" pitchFamily="34" charset="-122"/>
-                <a:ea typeface="微软雅黑" panose="020B0503020204020204" pitchFamily="34" charset="-122"/>
+                <a:latin typeface="Microsoft Tai Le" panose="020B0502040204020203" pitchFamily="34" charset="0"/>
+                <a:ea typeface="微软雅黑" panose="020B0503020204020204" pitchFamily="34" charset="-122"/>
+                <a:cs typeface="Microsoft Tai Le" panose="020B0502040204020203" pitchFamily="34" charset="0"/>
               </a:rPr>
               <a:t>eBPF</a:t>
             </a:r>
@@ -3466,7 +3114,7 @@
                   <a:srgbClr val="1C1917"/>
                 </a:solidFill>
                 <a:effectLst/>
-                <a:latin typeface="微软雅黑" panose="020B0503020204020204" pitchFamily="34" charset="-122"/>
+                <a:latin typeface="Microsoft Tai Le" panose="020B0502040204020203" pitchFamily="34" charset="0"/>
                 <a:ea typeface="微软雅黑" panose="020B0503020204020204" pitchFamily="34" charset="-122"/>
               </a:rPr>
               <a:t>是</a:t>
@@ -3477,8 +3125,9 @@
                   <a:srgbClr val="1C1917"/>
                 </a:solidFill>
                 <a:effectLst/>
-                <a:latin typeface="微软雅黑" panose="020B0503020204020204" pitchFamily="34" charset="-122"/>
-                <a:ea typeface="微软雅黑" panose="020B0503020204020204" pitchFamily="34" charset="-122"/>
+                <a:latin typeface="Microsoft Tai Le" panose="020B0502040204020203" pitchFamily="34" charset="0"/>
+                <a:ea typeface="微软雅黑" panose="020B0503020204020204" pitchFamily="34" charset="-122"/>
+                <a:cs typeface="Microsoft Tai Le" panose="020B0502040204020203" pitchFamily="34" charset="0"/>
               </a:rPr>
               <a:t>extended Berkeley Packet Filter</a:t>
             </a:r>
@@ -3488,7 +3137,7 @@
                   <a:srgbClr val="1C1917"/>
                 </a:solidFill>
                 <a:effectLst/>
-                <a:latin typeface="微软雅黑" panose="020B0503020204020204" pitchFamily="34" charset="-122"/>
+                <a:latin typeface="Microsoft Tai Le" panose="020B0502040204020203" pitchFamily="34" charset="0"/>
                 <a:ea typeface="微软雅黑" panose="020B0503020204020204" pitchFamily="34" charset="-122"/>
               </a:rPr>
               <a:t>的缩写</a:t>
@@ -3498,7 +3147,7 @@
                 <a:solidFill>
                   <a:srgbClr val="1C1917"/>
                 </a:solidFill>
-                <a:latin typeface="微软雅黑" panose="020B0503020204020204" pitchFamily="34" charset="-122"/>
+                <a:latin typeface="Microsoft Tai Le" panose="020B0502040204020203" pitchFamily="34" charset="0"/>
                 <a:ea typeface="微软雅黑" panose="020B0503020204020204" pitchFamily="34" charset="-122"/>
               </a:rPr>
               <a:t>，</a:t>
@@ -3509,7 +3158,7 @@
                   <a:srgbClr val="1C1917"/>
                 </a:solidFill>
                 <a:effectLst/>
-                <a:latin typeface="微软雅黑" panose="020B0503020204020204" pitchFamily="34" charset="-122"/>
+                <a:latin typeface="Microsoft Tai Le" panose="020B0502040204020203" pitchFamily="34" charset="0"/>
                 <a:ea typeface="微软雅黑" panose="020B0503020204020204" pitchFamily="34" charset="-122"/>
               </a:rPr>
               <a:t>它是一种虚拟机技术</a:t>
@@ -3520,7 +3169,7 @@
                   <a:srgbClr val="1C1917"/>
                 </a:solidFill>
                 <a:effectLst/>
-                <a:latin typeface="微软雅黑" panose="020B0503020204020204" pitchFamily="34" charset="-122"/>
+                <a:latin typeface="Microsoft Tai Le" panose="020B0502040204020203" pitchFamily="34" charset="0"/>
                 <a:ea typeface="微软雅黑" panose="020B0503020204020204" pitchFamily="34" charset="-122"/>
               </a:rPr>
               <a:t>,</a:t>
@@ -3531,7 +3180,7 @@
                   <a:srgbClr val="1C1917"/>
                 </a:solidFill>
                 <a:effectLst/>
-                <a:latin typeface="微软雅黑" panose="020B0503020204020204" pitchFamily="34" charset="-122"/>
+                <a:latin typeface="Microsoft Tai Le" panose="020B0502040204020203" pitchFamily="34" charset="0"/>
                 <a:ea typeface="微软雅黑" panose="020B0503020204020204" pitchFamily="34" charset="-122"/>
               </a:rPr>
               <a:t>可以在</a:t>
@@ -3542,8 +3191,9 @@
                   <a:srgbClr val="1C1917"/>
                 </a:solidFill>
                 <a:effectLst/>
-                <a:latin typeface="微软雅黑" panose="020B0503020204020204" pitchFamily="34" charset="-122"/>
-                <a:ea typeface="微软雅黑" panose="020B0503020204020204" pitchFamily="34" charset="-122"/>
+                <a:latin typeface="Microsoft Tai Le" panose="020B0502040204020203" pitchFamily="34" charset="0"/>
+                <a:ea typeface="微软雅黑" panose="020B0503020204020204" pitchFamily="34" charset="-122"/>
+                <a:cs typeface="Microsoft Tai Le" panose="020B0502040204020203" pitchFamily="34" charset="0"/>
               </a:rPr>
               <a:t>Linux</a:t>
             </a:r>
@@ -3553,7 +3203,7 @@
                   <a:srgbClr val="1C1917"/>
                 </a:solidFill>
                 <a:effectLst/>
-                <a:latin typeface="微软雅黑" panose="020B0503020204020204" pitchFamily="34" charset="-122"/>
+                <a:latin typeface="Microsoft Tai Le" panose="020B0502040204020203" pitchFamily="34" charset="0"/>
                 <a:ea typeface="微软雅黑" panose="020B0503020204020204" pitchFamily="34" charset="-122"/>
               </a:rPr>
               <a:t>内核运行沙盒化的程序。</a:t>
@@ -3563,7 +3213,7 @@
                 <a:srgbClr val="1C1917"/>
               </a:solidFill>
               <a:effectLst/>
-              <a:latin typeface="微软雅黑" panose="020B0503020204020204" pitchFamily="34" charset="-122"/>
+              <a:latin typeface="Microsoft Tai Le" panose="020B0502040204020203" pitchFamily="34" charset="0"/>
               <a:ea typeface="微软雅黑" panose="020B0503020204020204" pitchFamily="34" charset="-122"/>
             </a:endParaRPr>
           </a:p>
@@ -3587,7 +3237,7 @@
                   <a:srgbClr val="1C1917"/>
                 </a:solidFill>
                 <a:effectLst/>
-                <a:latin typeface="微软雅黑" panose="020B0503020204020204" pitchFamily="34" charset="-122"/>
+                <a:latin typeface="Microsoft Tai Le" panose="020B0502040204020203" pitchFamily="34" charset="0"/>
                 <a:ea typeface="微软雅黑" panose="020B0503020204020204" pitchFamily="34" charset="-122"/>
               </a:rPr>
               <a:t>eBPF</a:t>
@@ -3598,7 +3248,7 @@
                   <a:srgbClr val="1C1917"/>
                 </a:solidFill>
                 <a:effectLst/>
-                <a:latin typeface="微软雅黑" panose="020B0503020204020204" pitchFamily="34" charset="-122"/>
+                <a:latin typeface="Microsoft Tai Le" panose="020B0502040204020203" pitchFamily="34" charset="0"/>
                 <a:ea typeface="微软雅黑" panose="020B0503020204020204" pitchFamily="34" charset="-122"/>
               </a:rPr>
               <a:t>程序以</a:t>
@@ -3609,7 +3259,7 @@
                   <a:srgbClr val="1C1917"/>
                 </a:solidFill>
                 <a:effectLst/>
-                <a:latin typeface="微软雅黑" panose="020B0503020204020204" pitchFamily="34" charset="-122"/>
+                <a:latin typeface="Microsoft Tai Le" panose="020B0502040204020203" pitchFamily="34" charset="0"/>
                 <a:ea typeface="微软雅黑" panose="020B0503020204020204" pitchFamily="34" charset="-122"/>
               </a:rPr>
               <a:t>Bytecode</a:t>
@@ -3620,7 +3270,7 @@
                   <a:srgbClr val="1C1917"/>
                 </a:solidFill>
                 <a:effectLst/>
-                <a:latin typeface="微软雅黑" panose="020B0503020204020204" pitchFamily="34" charset="-122"/>
+                <a:latin typeface="Microsoft Tai Le" panose="020B0502040204020203" pitchFamily="34" charset="0"/>
                 <a:ea typeface="微软雅黑" panose="020B0503020204020204" pitchFamily="34" charset="-122"/>
               </a:rPr>
               <a:t>的形式存在</a:t>
@@ -3630,7 +3280,7 @@
                 <a:solidFill>
                   <a:srgbClr val="1C1917"/>
                 </a:solidFill>
-                <a:latin typeface="微软雅黑" panose="020B0503020204020204" pitchFamily="34" charset="-122"/>
+                <a:latin typeface="Microsoft Tai Le" panose="020B0502040204020203" pitchFamily="34" charset="0"/>
                 <a:ea typeface="微软雅黑" panose="020B0503020204020204" pitchFamily="34" charset="-122"/>
               </a:rPr>
               <a:t>，</a:t>
@@ -3641,7 +3291,7 @@
                   <a:srgbClr val="1C1917"/>
                 </a:solidFill>
                 <a:effectLst/>
-                <a:latin typeface="微软雅黑" panose="020B0503020204020204" pitchFamily="34" charset="-122"/>
+                <a:latin typeface="Microsoft Tai Le" panose="020B0502040204020203" pitchFamily="34" charset="0"/>
                 <a:ea typeface="微软雅黑" panose="020B0503020204020204" pitchFamily="34" charset="-122"/>
               </a:rPr>
               <a:t>需要通过</a:t>
@@ -3652,7 +3302,7 @@
                   <a:srgbClr val="1C1917"/>
                 </a:solidFill>
                 <a:effectLst/>
-                <a:latin typeface="微软雅黑" panose="020B0503020204020204" pitchFamily="34" charset="-122"/>
+                <a:latin typeface="Microsoft Tai Le" panose="020B0502040204020203" pitchFamily="34" charset="0"/>
                 <a:ea typeface="微软雅黑" panose="020B0503020204020204" pitchFamily="34" charset="-122"/>
               </a:rPr>
               <a:t>Verifier</a:t>
@@ -3663,7 +3313,7 @@
                   <a:srgbClr val="1C1917"/>
                 </a:solidFill>
                 <a:effectLst/>
-                <a:latin typeface="微软雅黑" panose="020B0503020204020204" pitchFamily="34" charset="-122"/>
+                <a:latin typeface="Microsoft Tai Le" panose="020B0502040204020203" pitchFamily="34" charset="0"/>
                 <a:ea typeface="微软雅黑" panose="020B0503020204020204" pitchFamily="34" charset="-122"/>
               </a:rPr>
               <a:t>进行校验后</a:t>
@@ -3674,7 +3324,7 @@
                   <a:srgbClr val="1C1917"/>
                 </a:solidFill>
                 <a:effectLst/>
-                <a:latin typeface="微软雅黑" panose="020B0503020204020204" pitchFamily="34" charset="-122"/>
+                <a:latin typeface="Microsoft Tai Le" panose="020B0502040204020203" pitchFamily="34" charset="0"/>
                 <a:ea typeface="微软雅黑" panose="020B0503020204020204" pitchFamily="34" charset="-122"/>
               </a:rPr>
               <a:t>,</a:t>
@@ -3685,7 +3335,7 @@
                   <a:srgbClr val="1C1917"/>
                 </a:solidFill>
                 <a:effectLst/>
-                <a:latin typeface="微软雅黑" panose="020B0503020204020204" pitchFamily="34" charset="-122"/>
+                <a:latin typeface="Microsoft Tai Le" panose="020B0502040204020203" pitchFamily="34" charset="0"/>
                 <a:ea typeface="微软雅黑" panose="020B0503020204020204" pitchFamily="34" charset="-122"/>
               </a:rPr>
               <a:t>才能加载到</a:t>
@@ -3696,7 +3346,7 @@
                   <a:srgbClr val="1C1917"/>
                 </a:solidFill>
                 <a:effectLst/>
-                <a:latin typeface="微软雅黑" panose="020B0503020204020204" pitchFamily="34" charset="-122"/>
+                <a:latin typeface="Microsoft Tai Le" panose="020B0502040204020203" pitchFamily="34" charset="0"/>
                 <a:ea typeface="微软雅黑" panose="020B0503020204020204" pitchFamily="34" charset="-122"/>
               </a:rPr>
               <a:t>Linux</a:t>
@@ -3707,7 +3357,7 @@
                   <a:srgbClr val="1C1917"/>
                 </a:solidFill>
                 <a:effectLst/>
-                <a:latin typeface="微软雅黑" panose="020B0503020204020204" pitchFamily="34" charset="-122"/>
+                <a:latin typeface="Microsoft Tai Le" panose="020B0502040204020203" pitchFamily="34" charset="0"/>
                 <a:ea typeface="微软雅黑" panose="020B0503020204020204" pitchFamily="34" charset="-122"/>
               </a:rPr>
               <a:t>内核中运行。</a:t>
@@ -3717,7 +3367,7 @@
                 <a:srgbClr val="1C1917"/>
               </a:solidFill>
               <a:effectLst/>
-              <a:latin typeface="微软雅黑" panose="020B0503020204020204" pitchFamily="34" charset="-122"/>
+              <a:latin typeface="Microsoft Tai Le" panose="020B0502040204020203" pitchFamily="34" charset="0"/>
               <a:ea typeface="微软雅黑" panose="020B0503020204020204" pitchFamily="34" charset="-122"/>
             </a:endParaRPr>
           </a:p>
@@ -3741,7 +3391,7 @@
                   <a:srgbClr val="1C1917"/>
                 </a:solidFill>
                 <a:effectLst/>
-                <a:latin typeface="微软雅黑" panose="020B0503020204020204" pitchFamily="34" charset="-122"/>
+                <a:latin typeface="Microsoft Tai Le" panose="020B0502040204020203" pitchFamily="34" charset="0"/>
                 <a:ea typeface="微软雅黑" panose="020B0503020204020204" pitchFamily="34" charset="-122"/>
               </a:rPr>
               <a:t>eBPF</a:t>
@@ -3752,7 +3402,7 @@
                   <a:srgbClr val="1C1917"/>
                 </a:solidFill>
                 <a:effectLst/>
-                <a:latin typeface="微软雅黑" panose="020B0503020204020204" pitchFamily="34" charset="-122"/>
+                <a:latin typeface="Microsoft Tai Le" panose="020B0502040204020203" pitchFamily="34" charset="0"/>
                 <a:ea typeface="微软雅黑" panose="020B0503020204020204" pitchFamily="34" charset="-122"/>
               </a:rPr>
               <a:t>提供了强大的</a:t>
@@ -3763,7 +3413,7 @@
                   <a:srgbClr val="1C1917"/>
                 </a:solidFill>
                 <a:effectLst/>
-                <a:latin typeface="微软雅黑" panose="020B0503020204020204" pitchFamily="34" charset="-122"/>
+                <a:latin typeface="Microsoft Tai Le" panose="020B0502040204020203" pitchFamily="34" charset="0"/>
                 <a:ea typeface="微软雅黑" panose="020B0503020204020204" pitchFamily="34" charset="-122"/>
               </a:rPr>
               <a:t>hook</a:t>
@@ -3774,7 +3424,7 @@
                   <a:srgbClr val="1C1917"/>
                 </a:solidFill>
                 <a:effectLst/>
-                <a:latin typeface="微软雅黑" panose="020B0503020204020204" pitchFamily="34" charset="-122"/>
+                <a:latin typeface="Microsoft Tai Le" panose="020B0502040204020203" pitchFamily="34" charset="0"/>
                 <a:ea typeface="微软雅黑" panose="020B0503020204020204" pitchFamily="34" charset="-122"/>
               </a:rPr>
               <a:t>机制</a:t>
@@ -3784,7 +3434,7 @@
                 <a:solidFill>
                   <a:srgbClr val="1C1917"/>
                 </a:solidFill>
-                <a:latin typeface="微软雅黑" panose="020B0503020204020204" pitchFamily="34" charset="-122"/>
+                <a:latin typeface="Microsoft Tai Le" panose="020B0502040204020203" pitchFamily="34" charset="0"/>
                 <a:ea typeface="微软雅黑" panose="020B0503020204020204" pitchFamily="34" charset="-122"/>
               </a:rPr>
               <a:t>，</a:t>
@@ -3795,7 +3445,7 @@
                   <a:srgbClr val="1C1917"/>
                 </a:solidFill>
                 <a:effectLst/>
-                <a:latin typeface="微软雅黑" panose="020B0503020204020204" pitchFamily="34" charset="-122"/>
+                <a:latin typeface="Microsoft Tai Le" panose="020B0502040204020203" pitchFamily="34" charset="0"/>
                 <a:ea typeface="微软雅黑" panose="020B0503020204020204" pitchFamily="34" charset="-122"/>
               </a:rPr>
               <a:t>可以挂载到多个</a:t>
@@ -3806,7 +3456,7 @@
                   <a:srgbClr val="1C1917"/>
                 </a:solidFill>
                 <a:effectLst/>
-                <a:latin typeface="微软雅黑" panose="020B0503020204020204" pitchFamily="34" charset="-122"/>
+                <a:latin typeface="Microsoft Tai Le" panose="020B0502040204020203" pitchFamily="34" charset="0"/>
                 <a:ea typeface="微软雅黑" panose="020B0503020204020204" pitchFamily="34" charset="-122"/>
               </a:rPr>
               <a:t>Linux</a:t>
@@ -3817,21 +3467,20 @@
                   <a:srgbClr val="1C1917"/>
                 </a:solidFill>
                 <a:effectLst/>
-                <a:latin typeface="微软雅黑" panose="020B0503020204020204" pitchFamily="34" charset="-122"/>
-                <a:ea typeface="微软雅黑" panose="020B0503020204020204" pitchFamily="34" charset="-122"/>
-              </a:rPr>
-              <a:t>子系统</a:t>
-            </a:r>
-            <a:r>
-              <a:rPr lang="en-US" altLang="zh-CN" sz="2000" b="0" i="0" dirty="0">
-                <a:solidFill>
-                  <a:srgbClr val="1C1917"/>
-                </a:solidFill>
-                <a:effectLst/>
-                <a:latin typeface="微软雅黑" panose="020B0503020204020204" pitchFamily="34" charset="-122"/>
-                <a:ea typeface="微软雅黑" panose="020B0503020204020204" pitchFamily="34" charset="-122"/>
-              </a:rPr>
-              <a:t>,</a:t>
+                <a:latin typeface="Microsoft Tai Le" panose="020B0502040204020203" pitchFamily="34" charset="0"/>
+                <a:ea typeface="微软雅黑" panose="020B0503020204020204" pitchFamily="34" charset="-122"/>
+              </a:rPr>
+              <a:t>子系统，如网络栈、文件系统等</a:t>
+            </a:r>
+            <a:r>
+              <a:rPr lang="zh-CN" altLang="en-US" sz="2000" dirty="0">
+                <a:solidFill>
+                  <a:srgbClr val="1C1917"/>
+                </a:solidFill>
+                <a:latin typeface="Microsoft Tai Le" panose="020B0502040204020203" pitchFamily="34" charset="0"/>
+                <a:ea typeface="微软雅黑" panose="020B0503020204020204" pitchFamily="34" charset="-122"/>
+              </a:rPr>
+              <a:t>，</a:t>
             </a:r>
             <a:r>
               <a:rPr lang="zh-CN" altLang="en-US" sz="2000" b="0" i="0" dirty="0">
@@ -3839,28 +3488,7 @@
                   <a:srgbClr val="1C1917"/>
                 </a:solidFill>
                 <a:effectLst/>
-                <a:latin typeface="微软雅黑" panose="020B0503020204020204" pitchFamily="34" charset="-122"/>
-                <a:ea typeface="微软雅黑" panose="020B0503020204020204" pitchFamily="34" charset="-122"/>
-              </a:rPr>
-              <a:t>如网络栈、文件系统等</a:t>
-            </a:r>
-            <a:r>
-              <a:rPr lang="zh-CN" altLang="en-US" sz="2000" dirty="0">
-                <a:solidFill>
-                  <a:srgbClr val="1C1917"/>
-                </a:solidFill>
-                <a:latin typeface="微软雅黑" panose="020B0503020204020204" pitchFamily="34" charset="-122"/>
-                <a:ea typeface="微软雅黑" panose="020B0503020204020204" pitchFamily="34" charset="-122"/>
-              </a:rPr>
-              <a:t>，</a:t>
-            </a:r>
-            <a:r>
-              <a:rPr lang="zh-CN" altLang="en-US" sz="2000" b="0" i="0" dirty="0">
-                <a:solidFill>
-                  <a:srgbClr val="1C1917"/>
-                </a:solidFill>
-                <a:effectLst/>
-                <a:latin typeface="微软雅黑" panose="020B0503020204020204" pitchFamily="34" charset="-122"/>
+                <a:latin typeface="Microsoft Tai Le" panose="020B0502040204020203" pitchFamily="34" charset="0"/>
                 <a:ea typeface="微软雅黑" panose="020B0503020204020204" pitchFamily="34" charset="-122"/>
               </a:rPr>
               <a:t>实现自定义的监控、分析和增强。</a:t>
@@ -3886,7 +3514,7 @@
                   <a:srgbClr val="1C1917"/>
                 </a:solidFill>
                 <a:effectLst/>
-                <a:latin typeface="微软雅黑" panose="020B0503020204020204" pitchFamily="34" charset="-122"/>
+                <a:latin typeface="Microsoft Tai Le" panose="020B0502040204020203" pitchFamily="34" charset="0"/>
                 <a:ea typeface="微软雅黑" panose="020B0503020204020204" pitchFamily="34" charset="-122"/>
               </a:rPr>
               <a:t>通过</a:t>
@@ -3897,7 +3525,7 @@
                   <a:srgbClr val="1C1917"/>
                 </a:solidFill>
                 <a:effectLst/>
-                <a:latin typeface="微软雅黑" panose="020B0503020204020204" pitchFamily="34" charset="-122"/>
+                <a:latin typeface="Microsoft Tai Le" panose="020B0502040204020203" pitchFamily="34" charset="0"/>
                 <a:ea typeface="微软雅黑" panose="020B0503020204020204" pitchFamily="34" charset="-122"/>
               </a:rPr>
               <a:t>BCC/</a:t>
@@ -3908,7 +3536,7 @@
                   <a:srgbClr val="1C1917"/>
                 </a:solidFill>
                 <a:effectLst/>
-                <a:latin typeface="微软雅黑" panose="020B0503020204020204" pitchFamily="34" charset="-122"/>
+                <a:latin typeface="Microsoft Tai Le" panose="020B0502040204020203" pitchFamily="34" charset="0"/>
                 <a:ea typeface="微软雅黑" panose="020B0503020204020204" pitchFamily="34" charset="-122"/>
               </a:rPr>
               <a:t>bpftrace</a:t>
@@ -3919,7 +3547,7 @@
                   <a:srgbClr val="1C1917"/>
                 </a:solidFill>
                 <a:effectLst/>
-                <a:latin typeface="微软雅黑" panose="020B0503020204020204" pitchFamily="34" charset="-122"/>
+                <a:latin typeface="Microsoft Tai Le" panose="020B0502040204020203" pitchFamily="34" charset="0"/>
                 <a:ea typeface="微软雅黑" panose="020B0503020204020204" pitchFamily="34" charset="-122"/>
               </a:rPr>
               <a:t>/</a:t>
@@ -3930,7 +3558,7 @@
                   <a:srgbClr val="1C1917"/>
                 </a:solidFill>
                 <a:effectLst/>
-                <a:latin typeface="微软雅黑" panose="020B0503020204020204" pitchFamily="34" charset="-122"/>
+                <a:latin typeface="Microsoft Tai Le" panose="020B0502040204020203" pitchFamily="34" charset="0"/>
                 <a:ea typeface="微软雅黑" panose="020B0503020204020204" pitchFamily="34" charset="-122"/>
               </a:rPr>
               <a:t>libbpf</a:t>
@@ -3941,7 +3569,7 @@
                   <a:srgbClr val="1C1917"/>
                 </a:solidFill>
                 <a:effectLst/>
-                <a:latin typeface="微软雅黑" panose="020B0503020204020204" pitchFamily="34" charset="-122"/>
+                <a:latin typeface="Microsoft Tai Le" panose="020B0502040204020203" pitchFamily="34" charset="0"/>
                 <a:ea typeface="微软雅黑" panose="020B0503020204020204" pitchFamily="34" charset="-122"/>
               </a:rPr>
               <a:t>/cilium </a:t>
@@ -3952,7 +3580,7 @@
                   <a:srgbClr val="1C1917"/>
                 </a:solidFill>
                 <a:effectLst/>
-                <a:latin typeface="微软雅黑" panose="020B0503020204020204" pitchFamily="34" charset="-122"/>
+                <a:latin typeface="Microsoft Tai Le" panose="020B0502040204020203" pitchFamily="34" charset="0"/>
                 <a:ea typeface="微软雅黑" panose="020B0503020204020204" pitchFamily="34" charset="-122"/>
               </a:rPr>
               <a:t>bpf</a:t>
@@ -3963,7 +3591,7 @@
                   <a:srgbClr val="1C1917"/>
                 </a:solidFill>
                 <a:effectLst/>
-                <a:latin typeface="微软雅黑" panose="020B0503020204020204" pitchFamily="34" charset="-122"/>
+                <a:latin typeface="Microsoft Tai Le" panose="020B0502040204020203" pitchFamily="34" charset="0"/>
                 <a:ea typeface="微软雅黑" panose="020B0503020204020204" pitchFamily="34" charset="-122"/>
               </a:rPr>
               <a:t>框架</a:t>
@@ -3973,7 +3601,7 @@
                 <a:solidFill>
                   <a:srgbClr val="1C1917"/>
                 </a:solidFill>
-                <a:latin typeface="微软雅黑" panose="020B0503020204020204" pitchFamily="34" charset="-122"/>
+                <a:latin typeface="Microsoft Tai Le" panose="020B0502040204020203" pitchFamily="34" charset="0"/>
                 <a:ea typeface="微软雅黑" panose="020B0503020204020204" pitchFamily="34" charset="-122"/>
               </a:rPr>
               <a:t>，</a:t>
@@ -3984,7 +3612,7 @@
                   <a:srgbClr val="1C1917"/>
                 </a:solidFill>
                 <a:effectLst/>
-                <a:latin typeface="微软雅黑" panose="020B0503020204020204" pitchFamily="34" charset="-122"/>
+                <a:latin typeface="Microsoft Tai Le" panose="020B0502040204020203" pitchFamily="34" charset="0"/>
                 <a:ea typeface="微软雅黑" panose="020B0503020204020204" pitchFamily="34" charset="-122"/>
               </a:rPr>
               <a:t>开发人员可以使用</a:t>
@@ -3995,7 +3623,7 @@
                   <a:srgbClr val="1C1917"/>
                 </a:solidFill>
                 <a:effectLst/>
-                <a:latin typeface="微软雅黑" panose="020B0503020204020204" pitchFamily="34" charset="-122"/>
+                <a:latin typeface="Microsoft Tai Le" panose="020B0502040204020203" pitchFamily="34" charset="0"/>
                 <a:ea typeface="微软雅黑" panose="020B0503020204020204" pitchFamily="34" charset="-122"/>
               </a:rPr>
               <a:t>C/Python/go</a:t>
@@ -4006,7 +3634,7 @@
                   <a:srgbClr val="1C1917"/>
                 </a:solidFill>
                 <a:effectLst/>
-                <a:latin typeface="微软雅黑" panose="020B0503020204020204" pitchFamily="34" charset="-122"/>
+                <a:latin typeface="Microsoft Tai Le" panose="020B0502040204020203" pitchFamily="34" charset="0"/>
                 <a:ea typeface="微软雅黑" panose="020B0503020204020204" pitchFamily="34" charset="-122"/>
               </a:rPr>
               <a:t>等语言编写</a:t>
@@ -4017,7 +3645,7 @@
                   <a:srgbClr val="1C1917"/>
                 </a:solidFill>
                 <a:effectLst/>
-                <a:latin typeface="微软雅黑" panose="020B0503020204020204" pitchFamily="34" charset="-122"/>
+                <a:latin typeface="Microsoft Tai Le" panose="020B0502040204020203" pitchFamily="34" charset="0"/>
                 <a:ea typeface="微软雅黑" panose="020B0503020204020204" pitchFamily="34" charset="-122"/>
               </a:rPr>
               <a:t>eBPF</a:t>
@@ -4028,7 +3656,7 @@
                   <a:srgbClr val="1C1917"/>
                 </a:solidFill>
                 <a:effectLst/>
-                <a:latin typeface="微软雅黑" panose="020B0503020204020204" pitchFamily="34" charset="-122"/>
+                <a:latin typeface="Microsoft Tai Le" panose="020B0502040204020203" pitchFamily="34" charset="0"/>
                 <a:ea typeface="微软雅黑" panose="020B0503020204020204" pitchFamily="34" charset="-122"/>
               </a:rPr>
               <a:t>程序</a:t>
@@ -4038,7 +3666,7 @@
                 <a:solidFill>
                   <a:srgbClr val="1C1917"/>
                 </a:solidFill>
-                <a:latin typeface="微软雅黑" panose="020B0503020204020204" pitchFamily="34" charset="-122"/>
+                <a:latin typeface="Microsoft Tai Le" panose="020B0502040204020203" pitchFamily="34" charset="0"/>
                 <a:ea typeface="微软雅黑" panose="020B0503020204020204" pitchFamily="34" charset="-122"/>
               </a:rPr>
               <a:t>，</a:t>
@@ -4049,7 +3677,7 @@
                   <a:srgbClr val="1C1917"/>
                 </a:solidFill>
                 <a:effectLst/>
-                <a:latin typeface="微软雅黑" panose="020B0503020204020204" pitchFamily="34" charset="-122"/>
+                <a:latin typeface="Microsoft Tai Le" panose="020B0502040204020203" pitchFamily="34" charset="0"/>
                 <a:ea typeface="微软雅黑" panose="020B0503020204020204" pitchFamily="34" charset="-122"/>
               </a:rPr>
               <a:t>无需掌握</a:t>
@@ -4060,7 +3688,7 @@
                   <a:srgbClr val="1C1917"/>
                 </a:solidFill>
                 <a:effectLst/>
-                <a:latin typeface="微软雅黑" panose="020B0503020204020204" pitchFamily="34" charset="-122"/>
+                <a:latin typeface="Microsoft Tai Le" panose="020B0502040204020203" pitchFamily="34" charset="0"/>
                 <a:ea typeface="微软雅黑" panose="020B0503020204020204" pitchFamily="34" charset="-122"/>
               </a:rPr>
               <a:t>Bytecode</a:t>
@@ -4071,13 +3699,13 @@
                   <a:srgbClr val="1C1917"/>
                 </a:solidFill>
                 <a:effectLst/>
-                <a:latin typeface="微软雅黑" panose="020B0503020204020204" pitchFamily="34" charset="-122"/>
+                <a:latin typeface="Microsoft Tai Le" panose="020B0502040204020203" pitchFamily="34" charset="0"/>
                 <a:ea typeface="微软雅黑" panose="020B0503020204020204" pitchFamily="34" charset="-122"/>
               </a:rPr>
               <a:t>细节。</a:t>
             </a:r>
             <a:endParaRPr lang="en-US" altLang="zh-CN" sz="2400" dirty="0">
-              <a:latin typeface="微软雅黑" panose="020B0503020204020204" pitchFamily="34" charset="-122"/>
+              <a:latin typeface="Microsoft Tai Le" panose="020B0502040204020203" pitchFamily="34" charset="0"/>
               <a:ea typeface="微软雅黑" panose="020B0503020204020204" pitchFamily="34" charset="-122"/>
             </a:endParaRPr>
           </a:p>
@@ -4090,7 +3718,7 @@
               <a:buChar char="Ø"/>
             </a:pPr>
             <a:endParaRPr lang="zh-CN" altLang="en-US" sz="2000" dirty="0">
-              <a:latin typeface="微软雅黑" panose="020B0503020204020204" pitchFamily="34" charset="-122"/>
+              <a:latin typeface="Microsoft Tai Le" panose="020B0502040204020203" pitchFamily="34" charset="0"/>
               <a:ea typeface="微软雅黑" panose="020B0503020204020204" pitchFamily="34" charset="-122"/>
             </a:endParaRPr>
           </a:p>
@@ -4153,12 +3781,72 @@
             <p:ph idx="1"/>
           </p:nvPr>
         </p:nvSpPr>
-        <p:spPr/>
-        <p:txBody>
-          <a:bodyPr/>
-          <a:lstStyle/>
-          <a:p>
-            <a:endParaRPr lang="zh-CN" altLang="en-US"/>
+        <p:spPr>
+          <a:xfrm>
+            <a:off x="778041" y="802941"/>
+            <a:ext cx="10515600" cy="4351338"/>
+          </a:xfrm>
+        </p:spPr>
+        <p:txBody>
+          <a:bodyPr/>
+          <a:lstStyle/>
+          <a:p>
+            <a:pPr marL="0" indent="0" algn="ctr">
+              <a:lnSpc>
+                <a:spcPct val="150000"/>
+              </a:lnSpc>
+              <a:buNone/>
+            </a:pPr>
+            <a:r>
+              <a:rPr lang="en-US" altLang="zh-CN" dirty="0">
+                <a:latin typeface="Microsoft Tai Le" panose="020B0502040204020203" pitchFamily="34" charset="0"/>
+                <a:ea typeface="微软雅黑" panose="020B0503020204020204" pitchFamily="34" charset="-122"/>
+              </a:rPr>
+              <a:t>x-monitor</a:t>
+            </a:r>
+          </a:p>
+          <a:p>
+            <a:pPr marL="0" indent="0">
+              <a:lnSpc>
+                <a:spcPct val="150000"/>
+              </a:lnSpc>
+              <a:buNone/>
+            </a:pPr>
+            <a:r>
+              <a:rPr lang="en-US" altLang="zh-CN" sz="2400" dirty="0">
+                <a:latin typeface="Microsoft Tai Le" panose="020B0502040204020203" pitchFamily="34" charset="0"/>
+                <a:ea typeface="微软雅黑" panose="020B0503020204020204" pitchFamily="34" charset="-122"/>
+              </a:rPr>
+              <a:t>x-monitor</a:t>
+            </a:r>
+            <a:r>
+              <a:rPr lang="zh-CN" altLang="en-US" sz="2400" dirty="0">
+                <a:latin typeface="Microsoft Tai Le" panose="020B0502040204020203" pitchFamily="34" charset="0"/>
+                <a:ea typeface="微软雅黑" panose="020B0503020204020204" pitchFamily="34" charset="-122"/>
+              </a:rPr>
+              <a:t>是一个可观察性和性能分析的工具，可帮助您了解系统和应用程序的行为方式。它使用 </a:t>
+            </a:r>
+            <a:r>
+              <a:rPr lang="en-US" altLang="zh-CN" sz="2400" dirty="0" err="1">
+                <a:latin typeface="Microsoft Tai Le" panose="020B0502040204020203" pitchFamily="34" charset="0"/>
+                <a:ea typeface="微软雅黑" panose="020B0503020204020204" pitchFamily="34" charset="-122"/>
+              </a:rPr>
+              <a:t>eBPF</a:t>
+            </a:r>
+            <a:r>
+              <a:rPr lang="en-US" altLang="zh-CN" sz="2400" dirty="0">
+                <a:latin typeface="Microsoft Tai Le" panose="020B0502040204020203" pitchFamily="34" charset="0"/>
+                <a:ea typeface="微软雅黑" panose="020B0503020204020204" pitchFamily="34" charset="-122"/>
+              </a:rPr>
+              <a:t> </a:t>
+            </a:r>
+            <a:r>
+              <a:rPr lang="zh-CN" altLang="en-US" sz="2400" dirty="0">
+                <a:latin typeface="Microsoft Tai Le" panose="020B0502040204020203" pitchFamily="34" charset="0"/>
+                <a:ea typeface="微软雅黑" panose="020B0503020204020204" pitchFamily="34" charset="-122"/>
+              </a:rPr>
+              <a:t>技术来挖掘您的系统并将该信息公开为您可以观察的。事件范围从事实到事实系统活动事件到检测可疑行为模式的复杂安全事件。</a:t>
+            </a:r>
           </a:p>
         </p:txBody>
       </p:sp>
@@ -4208,7 +3896,7 @@
 <file path=ppt/theme/theme1.xml><?xml version="1.0" encoding="utf-8"?>
 <a:theme xmlns:a="http://schemas.openxmlformats.org/drawingml/2006/main" name="Office 主题​​">
   <a:themeElements>
-    <a:clrScheme name="Office">
+    <a:clrScheme name="Office 主题​​">
       <a:dk1>
         <a:sysClr val="windowText" lastClr="000000"/>
       </a:dk1>
@@ -4222,22 +3910,22 @@
         <a:srgbClr val="E7E6E6"/>
       </a:lt2>
       <a:accent1>
-        <a:srgbClr val="4472C4"/>
+        <a:srgbClr val="1D9A78"/>
       </a:accent1>
       <a:accent2>
-        <a:srgbClr val="ED7D31"/>
+        <a:srgbClr val="8BC145"/>
       </a:accent2>
       <a:accent3>
-        <a:srgbClr val="A5A5A5"/>
+        <a:srgbClr val="36AFCE"/>
       </a:accent3>
       <a:accent4>
-        <a:srgbClr val="FFC000"/>
+        <a:srgbClr val="1D6FA9"/>
       </a:accent4>
       <a:accent5>
-        <a:srgbClr val="5B9BD5"/>
+        <a:srgbClr val="B74919"/>
       </a:accent5>
       <a:accent6>
-        <a:srgbClr val="70AD47"/>
+        <a:srgbClr val="F19D19"/>
       </a:accent6>
       <a:hlink>
         <a:srgbClr val="0563C1"/>
@@ -4246,9 +3934,9 @@
         <a:srgbClr val="954F72"/>
       </a:folHlink>
     </a:clrScheme>
-    <a:fontScheme name="Office">
+    <a:fontScheme name="Office 主题​​">
       <a:majorFont>
-        <a:latin typeface="等线 Light" panose="020F0302020204030204"/>
+        <a:latin typeface="Calibri Light" panose="020F0302020204030204"/>
         <a:ea typeface=""/>
         <a:cs typeface=""/>
         <a:font script="Jpan" typeface="游ゴシック Light"/>
@@ -4281,26 +3969,9 @@
         <a:font script="Viet" typeface="Times New Roman"/>
         <a:font script="Uigh" typeface="Microsoft Uighur"/>
         <a:font script="Geor" typeface="Sylfaen"/>
-        <a:font script="Armn" typeface="Arial"/>
-        <a:font script="Bugi" typeface="Leelawadee UI"/>
-        <a:font script="Bopo" typeface="Microsoft JhengHei"/>
-        <a:font script="Java" typeface="Javanese Text"/>
-        <a:font script="Lisu" typeface="Segoe UI"/>
-        <a:font script="Mymr" typeface="Myanmar Text"/>
-        <a:font script="Nkoo" typeface="Ebrima"/>
-        <a:font script="Olck" typeface="Nirmala UI"/>
-        <a:font script="Osma" typeface="Ebrima"/>
-        <a:font script="Phag" typeface="Phagspa"/>
-        <a:font script="Syrn" typeface="Estrangelo Edessa"/>
-        <a:font script="Syrj" typeface="Estrangelo Edessa"/>
-        <a:font script="Syre" typeface="Estrangelo Edessa"/>
-        <a:font script="Sora" typeface="Nirmala UI"/>
-        <a:font script="Tale" typeface="Microsoft Tai Le"/>
-        <a:font script="Talu" typeface="Microsoft New Tai Lue"/>
-        <a:font script="Tfng" typeface="Ebrima"/>
       </a:majorFont>
       <a:minorFont>
-        <a:latin typeface="等线" panose="020F0502020204030204"/>
+        <a:latin typeface="Calibri" panose="020F0502020204030204"/>
         <a:ea typeface=""/>
         <a:cs typeface=""/>
         <a:font script="Jpan" typeface="游ゴシック"/>
@@ -4333,26 +4004,9 @@
         <a:font script="Viet" typeface="Arial"/>
         <a:font script="Uigh" typeface="Microsoft Uighur"/>
         <a:font script="Geor" typeface="Sylfaen"/>
-        <a:font script="Armn" typeface="Arial"/>
-        <a:font script="Bugi" typeface="Leelawadee UI"/>
-        <a:font script="Bopo" typeface="Microsoft JhengHei"/>
-        <a:font script="Java" typeface="Javanese Text"/>
-        <a:font script="Lisu" typeface="Segoe UI"/>
-        <a:font script="Mymr" typeface="Myanmar Text"/>
-        <a:font script="Nkoo" typeface="Ebrima"/>
-        <a:font script="Olck" typeface="Nirmala UI"/>
-        <a:font script="Osma" typeface="Ebrima"/>
-        <a:font script="Phag" typeface="Phagspa"/>
-        <a:font script="Syrn" typeface="Estrangelo Edessa"/>
-        <a:font script="Syrj" typeface="Estrangelo Edessa"/>
-        <a:font script="Syre" typeface="Estrangelo Edessa"/>
-        <a:font script="Sora" typeface="Nirmala UI"/>
-        <a:font script="Tale" typeface="Microsoft Tai Le"/>
-        <a:font script="Talu" typeface="Microsoft New Tai Lue"/>
-        <a:font script="Tfng" typeface="Ebrima"/>
       </a:minorFont>
     </a:fontScheme>
-    <a:fmtScheme name="Office">
+    <a:fmtScheme name="Office 主题​​">
       <a:fillStyleLst>
         <a:solidFill>
           <a:schemeClr val="phClr"/>
@@ -4494,7 +4148,7 @@
   <a:extraClrSchemeLst/>
   <a:extLst>
     <a:ext uri="{05A4C25C-085E-4340-85A3-A5531E510DB2}">
-      <thm15:themeFamily xmlns:thm15="http://schemas.microsoft.com/office/thememl/2012/main" name="Office Theme" id="{62F939B6-93AF-4DB8-9C6B-D6C7DFDC589F}" vid="{4A3C46E8-61CC-4603-A589-7422A47A8E4A}"/>
+      <thm15:themeFamily xmlns:thm15="http://schemas.microsoft.com/office/thememl/2012/main" name="Office 2013 - 2022 Theme" id="{62F939B6-93AF-4DB8-9C6B-D6C7DFDC589F}" vid="{AE6F2518-B084-4896-AF52-66CC2144AA26}"/>
     </a:ext>
   </a:extLst>
 </a:theme>

</xml_diff>